<commit_message>
in the way to finalize
</commit_message>
<xml_diff>
--- a/PFE/v1.pptx
+++ b/PFE/v1.pptx
@@ -3920,16 +3920,10 @@
               <a:buNone/>
             </a:pPr>
             <a:r>
-              <a:rPr lang="fr-FR" altLang="fr-FR" sz="1200" i="1" dirty="0" err="1">
-                <a:latin typeface="Calibri" panose="020F0502020204030204" pitchFamily="34" charset="0"/>
-              </a:rPr>
-              <a:t>LCe</a:t>
-            </a:r>
-            <a:r>
               <a:rPr lang="fr-FR" altLang="fr-FR" sz="1200" i="1" dirty="0">
                 <a:latin typeface="Calibri" panose="020F0502020204030204" pitchFamily="34" charset="0"/>
               </a:rPr>
-              <a:t> projet décrit la mise en œuvre d’un système basé sur le web de l’Internet industriel des objets (</a:t>
+              <a:t>Ce projet décrit la mise en œuvre d’un système basé sur le web de l’Internet industriel des objets (</a:t>
             </a:r>
             <a:r>
               <a:rPr lang="fr-FR" altLang="fr-FR" sz="1200" i="1" dirty="0" err="1">
@@ -3965,17 +3959,8 @@
               <a:rPr lang="fr-FR" altLang="fr-FR" sz="1200" i="1" dirty="0">
                 <a:latin typeface="Calibri" panose="020F0502020204030204" pitchFamily="34" charset="0"/>
               </a:rPr>
-              <a:t> basé sur Python et transmises à une plate-forme Web alimentée par Django où elles sont affichées et enregistrées. L’application dispose également d’un module de système de gestion de la maintenance assistée par ordinateur (GMAO), qui permet de générer automatiquement des interventions de maintenance en réponse aux pannes de la machine. Cette solution offre une alternative peu coûteuse et évolutive aux systèmes SCADA conventionnels et illustre l’application pratique des principes de l’industrie 4.0 dans les environnements de fabrication </a:t>
+              <a:t> basé sur Python et transmises à une plate-forme Web alimentée par Django où elles sont affichées et enregistrées. L’application dispose également d’un module de système de gestion de la maintenance assistée par ordinateur (GMAO), qui permet de générer automatiquement des interventions de maintenance en réponse aux pannes de la machine. Cette solution offre une alternative peu coûteuse et évolutive aux systèmes SCADA conventionnels et illustre l’application pratique des principes de l’industrie 4.0 dans les environnements de fabrication intelligents..</a:t>
             </a:r>
-            <a:r>
-              <a:rPr lang="fr-FR" altLang="fr-FR" sz="1200" i="1">
-                <a:latin typeface="Calibri" panose="020F0502020204030204" pitchFamily="34" charset="0"/>
-              </a:rPr>
-              <a:t>intelligents..</a:t>
-            </a:r>
-            <a:endParaRPr lang="fr-FR" altLang="fr-FR" sz="1200" i="1" dirty="0">
-              <a:latin typeface="Calibri" panose="020F0502020204030204" pitchFamily="34" charset="0"/>
-            </a:endParaRPr>
           </a:p>
           <a:p>
             <a:pPr algn="ctr" eaLnBrk="1" hangingPunct="1">
@@ -8255,83 +8240,8 @@
                 <a:latin typeface="Arial" charset="0"/>
                 <a:cs typeface="Arial" charset="0"/>
               </a:rPr>
-              <a:t>Réf </a:t>
+              <a:t>Réf : ………..</a:t>
             </a:r>
-            <a:r>
-              <a:rPr lang="fr-FR" sz="1900" b="1">
-                <a:ln w="1905"/>
-                <a:gradFill>
-                  <a:gsLst>
-                    <a:gs pos="0">
-                      <a:schemeClr val="accent6">
-                        <a:shade val="20000"/>
-                        <a:satMod val="200000"/>
-                      </a:schemeClr>
-                    </a:gs>
-                    <a:gs pos="78000">
-                      <a:schemeClr val="accent6">
-                        <a:tint val="90000"/>
-                        <a:shade val="89000"/>
-                        <a:satMod val="220000"/>
-                      </a:schemeClr>
-                    </a:gs>
-                    <a:gs pos="100000">
-                      <a:schemeClr val="accent6">
-                        <a:tint val="12000"/>
-                        <a:satMod val="255000"/>
-                      </a:schemeClr>
-                    </a:gs>
-                  </a:gsLst>
-                  <a:lin ang="5400000"/>
-                </a:gradFill>
-                <a:effectLst>
-                  <a:innerShdw blurRad="69850" dist="43180" dir="5400000">
-                    <a:srgbClr val="000000">
-                      <a:alpha val="65000"/>
-                    </a:srgbClr>
-                  </a:innerShdw>
-                </a:effectLst>
-                <a:latin typeface="Arial" charset="0"/>
-                <a:cs typeface="Arial" charset="0"/>
-              </a:rPr>
-              <a:t>: ………..</a:t>
-            </a:r>
-            <a:endParaRPr lang="fr-FR" sz="1900" b="1" dirty="0">
-              <a:ln w="1905"/>
-              <a:gradFill>
-                <a:gsLst>
-                  <a:gs pos="0">
-                    <a:schemeClr val="accent6">
-                      <a:shade val="20000"/>
-                      <a:satMod val="200000"/>
-                    </a:schemeClr>
-                  </a:gs>
-                  <a:gs pos="78000">
-                    <a:schemeClr val="accent6">
-                      <a:tint val="90000"/>
-                      <a:shade val="89000"/>
-                      <a:satMod val="220000"/>
-                    </a:schemeClr>
-                  </a:gs>
-                  <a:gs pos="100000">
-                    <a:schemeClr val="accent6">
-                      <a:tint val="12000"/>
-                      <a:satMod val="255000"/>
-                    </a:schemeClr>
-                  </a:gs>
-                </a:gsLst>
-                <a:lin ang="5400000"/>
-              </a:gradFill>
-              <a:effectLst>
-                <a:innerShdw blurRad="69850" dist="43180" dir="5400000">
-                  <a:srgbClr val="000000">
-                    <a:alpha val="65000"/>
-                  </a:srgbClr>
-                </a:innerShdw>
-              </a:effectLst>
-              <a:latin typeface="Arial" charset="0"/>
-              <a:cs typeface="Arial" charset="0"/>
-            </a:endParaRPr>
           </a:p>
         </p:txBody>
       </p:sp>

</xml_diff>

<commit_message>
2 days before finishing my project
</commit_message>
<xml_diff>
--- a/PFE/v1.pptx
+++ b/PFE/v1.pptx
@@ -3706,8 +3706,8 @@
         </p:nvSpPr>
         <p:spPr bwMode="auto">
           <a:xfrm>
-            <a:off x="685800" y="1911091"/>
-            <a:ext cx="8153400" cy="2575442"/>
+            <a:off x="685800" y="2192098"/>
+            <a:ext cx="8153400" cy="2013428"/>
           </a:xfrm>
           <a:prstGeom prst="rect">
             <a:avLst/>
@@ -3923,63 +3923,8 @@
               <a:rPr lang="fr-FR" altLang="fr-FR" sz="1200" i="1" dirty="0">
                 <a:latin typeface="Calibri" panose="020F0502020204030204" pitchFamily="34" charset="0"/>
               </a:rPr>
-              <a:t>Ce projet décrit la mise en œuvre d’un système basé sur le web de l’Internet industriel des objets (</a:t>
+              <a:t>Ce projet consiste à concevoir un système intégré de GMAO et de supervision (SCADA) pour améliorer la maintenance de l’usine Lear Corporation de Menzel Bourguiba. L’objectif est d’informatiser les processus de maintenance, de centraliser les données et de suivre l’état des machines en temps réel via une application web. Développée avec Django, la solution propose des interfaces dédiées aux administrateurs et aux techniciens pour signaler les anomalies, suivre les interventions et visualiser les données. La bibliothèque Snap7 permet la communication avec les automates Siemens S7-1200, remplaçant ainsi les systèmes SCADA traditionnels tels que WinCC par un tableau de bord moderne accessible à distance. Ce projet s’inscrit dans la démarche Industrie 4.0, renforçant la réactivité, réduisant les temps d’arrêt et posant les bases d’une maintenance intelligente.</a:t>
             </a:r>
-            <a:r>
-              <a:rPr lang="fr-FR" altLang="fr-FR" sz="1200" i="1" dirty="0" err="1">
-                <a:latin typeface="Calibri" panose="020F0502020204030204" pitchFamily="34" charset="0"/>
-              </a:rPr>
-              <a:t>IIoT</a:t>
-            </a:r>
-            <a:r>
-              <a:rPr lang="fr-FR" altLang="fr-FR" sz="1200" i="1" dirty="0">
-                <a:latin typeface="Calibri" panose="020F0502020204030204" pitchFamily="34" charset="0"/>
-              </a:rPr>
-              <a:t>) pour la surveillance en temps réel et la gestion de la maintenance d’une machine de tri industrielle contrôlée par API Siemens S7-1200. Le système combine l’acquisition de données au niveau de la machine avec une application Web sur mesure, permettant aux opérateurs et au personnel de maintenance de visualiser l’état de la machine, le nombre de productions et les conditions de panne en temps réel. Les données sont collectées à partir de l’API via </a:t>
-            </a:r>
-            <a:r>
-              <a:rPr lang="fr-FR" altLang="fr-FR" sz="1200" i="1" dirty="0" err="1">
-                <a:latin typeface="Calibri" panose="020F0502020204030204" pitchFamily="34" charset="0"/>
-              </a:rPr>
-              <a:t>l’edge</a:t>
-            </a:r>
-            <a:r>
-              <a:rPr lang="fr-FR" altLang="fr-FR" sz="1200" i="1" dirty="0">
-                <a:latin typeface="Calibri" panose="020F0502020204030204" pitchFamily="34" charset="0"/>
-              </a:rPr>
-              <a:t> </a:t>
-            </a:r>
-            <a:r>
-              <a:rPr lang="fr-FR" altLang="fr-FR" sz="1200" i="1" dirty="0" err="1">
-                <a:latin typeface="Calibri" panose="020F0502020204030204" pitchFamily="34" charset="0"/>
-              </a:rPr>
-              <a:t>computing</a:t>
-            </a:r>
-            <a:r>
-              <a:rPr lang="fr-FR" altLang="fr-FR" sz="1200" i="1" dirty="0">
-                <a:latin typeface="Calibri" panose="020F0502020204030204" pitchFamily="34" charset="0"/>
-              </a:rPr>
-              <a:t> basé sur Python et transmises à une plate-forme Web alimentée par Django où elles sont affichées et enregistrées. L’application dispose également d’un module de système de gestion de la maintenance assistée par ordinateur (GMAO), qui permet de générer automatiquement des interventions de maintenance en réponse aux pannes de la machine. Cette solution offre une alternative peu coûteuse et évolutive aux systèmes SCADA conventionnels et illustre l’application pratique des principes de l’industrie 4.0 dans les environnements de fabrication intelligents..</a:t>
-            </a:r>
-          </a:p>
-          <a:p>
-            <a:pPr algn="ctr" eaLnBrk="1" hangingPunct="1">
-              <a:spcBef>
-                <a:spcPct val="0"/>
-              </a:spcBef>
-              <a:buFontTx/>
-              <a:buNone/>
-            </a:pPr>
-            <a:endParaRPr lang="fr-FR" altLang="fr-FR" sz="100" dirty="0"/>
-          </a:p>
-          <a:p>
-            <a:pPr algn="ctr" eaLnBrk="1" hangingPunct="1">
-              <a:spcBef>
-                <a:spcPct val="0"/>
-              </a:spcBef>
-              <a:buFontTx/>
-              <a:buNone/>
-            </a:pPr>
             <a:endParaRPr lang="fr-FR" altLang="fr-FR" sz="100" dirty="0"/>
           </a:p>
           <a:p>
@@ -4002,22 +3947,26 @@
             </a:r>
           </a:p>
           <a:p>
-            <a:pPr algn="just" eaLnBrk="1" hangingPunct="1">
-              <a:lnSpc>
-                <a:spcPct val="120000"/>
-              </a:lnSpc>
+            <a:pPr eaLnBrk="1" hangingPunct="1">
               <a:spcBef>
                 <a:spcPct val="0"/>
               </a:spcBef>
-              <a:buFont typeface="Wingdings 2" panose="05020102010507070707" pitchFamily="18" charset="2"/>
+              <a:buFontTx/>
               <a:buNone/>
             </a:pPr>
             <a:r>
-              <a:rPr lang="fr-FR" altLang="fr-FR" sz="1100" dirty="0">
+              <a:rPr lang="sv-SE" altLang="fr-FR" sz="1100" b="1" dirty="0">
                 <a:latin typeface="Calibri" panose="020F0502020204030204" pitchFamily="34" charset="0"/>
+                <a:ea typeface="Calibri" panose="020F0502020204030204" pitchFamily="34" charset="0"/>
+                <a:cs typeface="Calibri" panose="020F0502020204030204" pitchFamily="34" charset="0"/>
               </a:rPr>
-              <a:t>Maximum six mots clés. Les mots clés sont séparés par des virgules. Ils sont précédés du mot MOTS CLES en majuscule et en caractères gras. La police est ‘Calibri’, de taille 11-pts, interligne simple.</a:t>
+              <a:t>IIOT, SCADA, API, GMAO, PYTHON, SNAP-7</a:t>
             </a:r>
+            <a:endParaRPr lang="fr-FR" altLang="fr-FR" sz="1100" b="1" dirty="0">
+              <a:latin typeface="Calibri" panose="020F0502020204030204" pitchFamily="34" charset="0"/>
+              <a:ea typeface="Calibri" panose="020F0502020204030204" pitchFamily="34" charset="0"/>
+              <a:cs typeface="Calibri" panose="020F0502020204030204" pitchFamily="34" charset="0"/>
+            </a:endParaRPr>
           </a:p>
         </p:txBody>
       </p:sp>
@@ -4037,8 +3986,8 @@
         </p:nvSpPr>
         <p:spPr bwMode="auto">
           <a:xfrm>
-            <a:off x="685800" y="10134600"/>
-            <a:ext cx="8153400" cy="930275"/>
+            <a:off x="633664" y="10083460"/>
+            <a:ext cx="8153400" cy="1192306"/>
           </a:xfrm>
           <a:prstGeom prst="rect">
             <a:avLst/>
@@ -4104,32 +4053,12 @@
               <a:defRPr/>
             </a:pPr>
             <a:r>
-              <a:rPr lang="fr-FR" sz="1100" dirty="0">
+              <a:rPr lang="fr-FR" sz="1200" dirty="0">
                 <a:latin typeface="Calibri" pitchFamily="34" charset="0"/>
                 <a:cs typeface="Arial" charset="0"/>
               </a:rPr>
-              <a:t>La conclusion doit rapporter clairement les avantages,  les limites et les applications possibles du travail. La police est ‘Calibri ’, de taille 12-pts, interligne simple.</a:t>
+              <a:t>Ce projet a permis de développer un système intégré de GMAO et SCADA adapté à l’usine Lear Corporation. Grâce à l’automatisation et à la centralisation des données, la maintenance est plus réactive et efficace. La communication avec les automates Siemens via Snap7 a été fiable. Cette solution constitue une base solide pour une maintenance intelligente dans le cadre de l’Industrie 4.0.</a:t>
             </a:r>
-          </a:p>
-          <a:p>
-            <a:pPr marL="155575" indent="-58738" algn="ctr" eaLnBrk="1" fontAlgn="auto" hangingPunct="1">
-              <a:lnSpc>
-                <a:spcPct val="120000"/>
-              </a:lnSpc>
-              <a:spcBef>
-                <a:spcPts val="0"/>
-              </a:spcBef>
-              <a:spcAft>
-                <a:spcPts val="0"/>
-              </a:spcAft>
-              <a:buFont typeface="Wingdings 2"/>
-              <a:buNone/>
-              <a:defRPr/>
-            </a:pPr>
-            <a:endParaRPr lang="fr-FR" sz="1100" dirty="0">
-              <a:latin typeface="Calibri" pitchFamily="34" charset="0"/>
-              <a:cs typeface="Arial" charset="0"/>
-            </a:endParaRPr>
           </a:p>
         </p:txBody>
       </p:sp>
@@ -4345,8 +4274,8 @@
         </p:nvSpPr>
         <p:spPr bwMode="auto">
           <a:xfrm>
-            <a:off x="695325" y="5208588"/>
-            <a:ext cx="8077200" cy="658812"/>
+            <a:off x="695325" y="5139139"/>
+            <a:ext cx="8077200" cy="797711"/>
           </a:xfrm>
           <a:prstGeom prst="rect">
             <a:avLst/>
@@ -4511,7 +4440,7 @@
             </a:lvl9pPr>
           </a:lstStyle>
           <a:p>
-            <a:pPr eaLnBrk="1" hangingPunct="1">
+            <a:pPr algn="just" eaLnBrk="1" hangingPunct="1">
               <a:spcBef>
                 <a:spcPct val="0"/>
               </a:spcBef>
@@ -4519,7 +4448,7 @@
               <a:buNone/>
             </a:pPr>
             <a:r>
-              <a:rPr lang="fr-FR" altLang="fr-FR" sz="1400" b="1">
+              <a:rPr lang="fr-FR" altLang="fr-FR" sz="1400" b="1" dirty="0">
                 <a:solidFill>
                   <a:srgbClr val="000099"/>
                 </a:solidFill>
@@ -4528,7 +4457,7 @@
               </a:rPr>
               <a:t>RESULTATS</a:t>
             </a:r>
-            <a:endParaRPr lang="fr-FR" altLang="fr-FR" sz="1000" b="1">
+            <a:endParaRPr lang="fr-FR" altLang="fr-FR" sz="1000" b="1" dirty="0">
               <a:solidFill>
                 <a:srgbClr val="000099"/>
               </a:solidFill>
@@ -4545,50 +4474,18 @@
               <a:buNone/>
             </a:pPr>
             <a:r>
-              <a:rPr lang="fr-FR" altLang="fr-FR" sz="900">
-                <a:cs typeface="Times New Roman" panose="02020603050405020304" pitchFamily="18" charset="0"/>
+              <a:rPr lang="fr-FR" sz="1200" dirty="0">
+                <a:latin typeface="Calibri" panose="020F0502020204030204" pitchFamily="34" charset="0"/>
+                <a:ea typeface="Calibri" panose="020F0502020204030204" pitchFamily="34" charset="0"/>
+                <a:cs typeface="Calibri" panose="020F0502020204030204" pitchFamily="34" charset="0"/>
               </a:rPr>
-              <a:t>       </a:t>
+              <a:t>Le système développé a permis une centralisation efficace des données de maintenance et un suivi en temps réel des machines. La communication avec les automates Siemens via Snap7 s’est avérée fiable et rapide. L’interface web facilite la gestion des interventions et améliore la réactivité des équipes de maintenance.</a:t>
             </a:r>
-          </a:p>
-          <a:p>
-            <a:pPr algn="just" eaLnBrk="1" hangingPunct="1">
-              <a:spcBef>
-                <a:spcPct val="0"/>
-              </a:spcBef>
-              <a:buFontTx/>
-              <a:buNone/>
-            </a:pPr>
-            <a:endParaRPr lang="fr-FR" altLang="fr-FR" sz="200">
-              <a:cs typeface="Times New Roman" panose="02020603050405020304" pitchFamily="18" charset="0"/>
+            <a:endParaRPr lang="fr-FR" altLang="fr-FR" sz="2400" dirty="0">
+              <a:latin typeface="Calibri" panose="020F0502020204030204" pitchFamily="34" charset="0"/>
+              <a:ea typeface="Calibri" panose="020F0502020204030204" pitchFamily="34" charset="0"/>
+              <a:cs typeface="Calibri" panose="020F0502020204030204" pitchFamily="34" charset="0"/>
             </a:endParaRPr>
-          </a:p>
-          <a:p>
-            <a:pPr algn="just" eaLnBrk="1" hangingPunct="1">
-              <a:spcBef>
-                <a:spcPct val="0"/>
-              </a:spcBef>
-              <a:buFontTx/>
-              <a:buNone/>
-            </a:pPr>
-            <a:endParaRPr lang="fr-FR" altLang="fr-FR" sz="400">
-              <a:latin typeface="Calibri" panose="020F0502020204030204" pitchFamily="34" charset="0"/>
-            </a:endParaRPr>
-          </a:p>
-          <a:p>
-            <a:pPr algn="just" eaLnBrk="1" hangingPunct="1">
-              <a:spcBef>
-                <a:spcPct val="0"/>
-              </a:spcBef>
-              <a:buFontTx/>
-              <a:buNone/>
-            </a:pPr>
-            <a:r>
-              <a:rPr lang="fr-FR" altLang="fr-FR" sz="1200">
-                <a:latin typeface="Calibri" panose="020F0502020204030204" pitchFamily="34" charset="0"/>
-              </a:rPr>
-              <a:t>Présente les travaux effectués et la contribution du papier. La police est ‘Calibri ’, de taille 12-pts, interligne simple.</a:t>
-            </a:r>
           </a:p>
         </p:txBody>
       </p:sp>
@@ -4794,8 +4691,8 @@
         </p:nvSpPr>
         <p:spPr bwMode="auto">
           <a:xfrm>
-            <a:off x="935038" y="8772525"/>
-            <a:ext cx="2124075" cy="319088"/>
+            <a:off x="736614" y="8686800"/>
+            <a:ext cx="2124075" cy="212935"/>
           </a:xfrm>
           <a:prstGeom prst="rect">
             <a:avLst/>
@@ -4968,204 +4865,36 @@
               <a:buNone/>
             </a:pPr>
             <a:r>
-              <a:rPr lang="fr-FR" altLang="fr-FR" sz="1100">
+              <a:rPr lang="fr-FR" altLang="fr-FR" sz="1100" dirty="0" err="1">
                 <a:cs typeface="Times New Roman" panose="02020603050405020304" pitchFamily="18" charset="0"/>
               </a:rPr>
-              <a:t>Fig 1</a:t>
+              <a:t>Fig</a:t>
             </a:r>
             <a:r>
-              <a:rPr lang="fr-FR" altLang="fr-FR" sz="700">
+              <a:rPr lang="fr-FR" altLang="fr-FR" sz="1100" dirty="0">
                 <a:cs typeface="Times New Roman" panose="02020603050405020304" pitchFamily="18" charset="0"/>
               </a:rPr>
-              <a:t>: ……………………</a:t>
+              <a:t> 1</a:t>
             </a:r>
-            <a:endParaRPr lang="fr-FR" altLang="fr-FR" sz="700"/>
-          </a:p>
-        </p:txBody>
-      </p:sp>
-      <p:sp>
-        <p:nvSpPr>
-          <p:cNvPr id="2056" name="Rectangle 71">
-            <a:extLst>
-              <a:ext uri="{FF2B5EF4-FFF2-40B4-BE49-F238E27FC236}">
-                <a16:creationId xmlns:a16="http://schemas.microsoft.com/office/drawing/2014/main" id="{CF124523-3C8A-DE70-B84D-55FD10FF66E6}"/>
-              </a:ext>
-            </a:extLst>
-          </p:cNvPr>
-          <p:cNvSpPr>
-            <a:spLocks noChangeArrowheads="1"/>
-          </p:cNvSpPr>
-          <p:nvPr/>
-        </p:nvSpPr>
-        <p:spPr bwMode="auto">
-          <a:xfrm>
-            <a:off x="896938" y="6388100"/>
-            <a:ext cx="2124075" cy="2149475"/>
-          </a:xfrm>
-          <a:prstGeom prst="rect">
-            <a:avLst/>
-          </a:prstGeom>
-          <a:noFill/>
-          <a:ln w="9525">
-            <a:solidFill>
-              <a:srgbClr val="002060"/>
-            </a:solidFill>
-            <a:miter lim="800000"/>
-            <a:headEnd/>
-            <a:tailEnd/>
-          </a:ln>
-          <a:extLst>
-            <a:ext uri="{909E8E84-426E-40DD-AFC4-6F175D3DCCD1}">
-              <a14:hiddenFill xmlns:a14="http://schemas.microsoft.com/office/drawing/2010/main">
-                <a:solidFill>
-                  <a:srgbClr val="FFFFFF"/>
-                </a:solidFill>
-              </a14:hiddenFill>
-            </a:ext>
-          </a:extLst>
-        </p:spPr>
-        <p:txBody>
-          <a:bodyPr wrap="none" lIns="31602" tIns="15801" rIns="31602" bIns="15801" anchor="ctr"/>
-          <a:lstStyle>
-            <a:lvl1pPr defTabSz="315913">
-              <a:spcBef>
-                <a:spcPct val="20000"/>
-              </a:spcBef>
-              <a:buChar char="•"/>
-              <a:defRPr sz="4500">
-                <a:solidFill>
-                  <a:schemeClr val="tx1"/>
-                </a:solidFill>
-                <a:latin typeface="Arial" panose="020B0604020202020204" pitchFamily="34" charset="0"/>
-                <a:cs typeface="Arial" panose="020B0604020202020204" pitchFamily="34" charset="0"/>
-              </a:defRPr>
-            </a:lvl1pPr>
-            <a:lvl2pPr marL="742950" indent="-285750" defTabSz="315913">
-              <a:spcBef>
-                <a:spcPct val="20000"/>
-              </a:spcBef>
-              <a:buChar char="–"/>
-              <a:defRPr sz="3900">
-                <a:solidFill>
-                  <a:schemeClr val="tx1"/>
-                </a:solidFill>
-                <a:latin typeface="Arial" panose="020B0604020202020204" pitchFamily="34" charset="0"/>
-                <a:cs typeface="Arial" panose="020B0604020202020204" pitchFamily="34" charset="0"/>
-              </a:defRPr>
-            </a:lvl2pPr>
-            <a:lvl3pPr marL="1143000" indent="-228600" defTabSz="315913">
-              <a:spcBef>
-                <a:spcPct val="20000"/>
-              </a:spcBef>
-              <a:buChar char="•"/>
-              <a:defRPr sz="3400">
-                <a:solidFill>
-                  <a:schemeClr val="tx1"/>
-                </a:solidFill>
-                <a:latin typeface="Arial" panose="020B0604020202020204" pitchFamily="34" charset="0"/>
-                <a:cs typeface="Arial" panose="020B0604020202020204" pitchFamily="34" charset="0"/>
-              </a:defRPr>
-            </a:lvl3pPr>
-            <a:lvl4pPr marL="1600200" indent="-228600" defTabSz="315913">
-              <a:spcBef>
-                <a:spcPct val="20000"/>
-              </a:spcBef>
-              <a:buChar char="–"/>
-              <a:defRPr sz="2800">
-                <a:solidFill>
-                  <a:schemeClr val="tx1"/>
-                </a:solidFill>
-                <a:latin typeface="Arial" panose="020B0604020202020204" pitchFamily="34" charset="0"/>
-                <a:cs typeface="Arial" panose="020B0604020202020204" pitchFamily="34" charset="0"/>
-              </a:defRPr>
-            </a:lvl4pPr>
-            <a:lvl5pPr marL="2057400" indent="-228600" defTabSz="315913">
-              <a:spcBef>
-                <a:spcPct val="20000"/>
-              </a:spcBef>
-              <a:buChar char="»"/>
-              <a:defRPr sz="2800">
-                <a:solidFill>
-                  <a:schemeClr val="tx1"/>
-                </a:solidFill>
-                <a:latin typeface="Arial" panose="020B0604020202020204" pitchFamily="34" charset="0"/>
-                <a:cs typeface="Arial" panose="020B0604020202020204" pitchFamily="34" charset="0"/>
-              </a:defRPr>
-            </a:lvl5pPr>
-            <a:lvl6pPr marL="2514600" indent="-228600" defTabSz="315913" eaLnBrk="0" fontAlgn="base" hangingPunct="0">
-              <a:spcBef>
-                <a:spcPct val="20000"/>
-              </a:spcBef>
-              <a:spcAft>
-                <a:spcPct val="0"/>
-              </a:spcAft>
-              <a:buChar char="»"/>
-              <a:defRPr sz="2800">
-                <a:solidFill>
-                  <a:schemeClr val="tx1"/>
-                </a:solidFill>
-                <a:latin typeface="Arial" panose="020B0604020202020204" pitchFamily="34" charset="0"/>
-                <a:cs typeface="Arial" panose="020B0604020202020204" pitchFamily="34" charset="0"/>
-              </a:defRPr>
-            </a:lvl6pPr>
-            <a:lvl7pPr marL="2971800" indent="-228600" defTabSz="315913" eaLnBrk="0" fontAlgn="base" hangingPunct="0">
-              <a:spcBef>
-                <a:spcPct val="20000"/>
-              </a:spcBef>
-              <a:spcAft>
-                <a:spcPct val="0"/>
-              </a:spcAft>
-              <a:buChar char="»"/>
-              <a:defRPr sz="2800">
-                <a:solidFill>
-                  <a:schemeClr val="tx1"/>
-                </a:solidFill>
-                <a:latin typeface="Arial" panose="020B0604020202020204" pitchFamily="34" charset="0"/>
-                <a:cs typeface="Arial" panose="020B0604020202020204" pitchFamily="34" charset="0"/>
-              </a:defRPr>
-            </a:lvl7pPr>
-            <a:lvl8pPr marL="3429000" indent="-228600" defTabSz="315913" eaLnBrk="0" fontAlgn="base" hangingPunct="0">
-              <a:spcBef>
-                <a:spcPct val="20000"/>
-              </a:spcBef>
-              <a:spcAft>
-                <a:spcPct val="0"/>
-              </a:spcAft>
-              <a:buChar char="»"/>
-              <a:defRPr sz="2800">
-                <a:solidFill>
-                  <a:schemeClr val="tx1"/>
-                </a:solidFill>
-                <a:latin typeface="Arial" panose="020B0604020202020204" pitchFamily="34" charset="0"/>
-                <a:cs typeface="Arial" panose="020B0604020202020204" pitchFamily="34" charset="0"/>
-              </a:defRPr>
-            </a:lvl8pPr>
-            <a:lvl9pPr marL="3886200" indent="-228600" defTabSz="315913" eaLnBrk="0" fontAlgn="base" hangingPunct="0">
-              <a:spcBef>
-                <a:spcPct val="20000"/>
-              </a:spcBef>
-              <a:spcAft>
-                <a:spcPct val="0"/>
-              </a:spcAft>
-              <a:buChar char="»"/>
-              <a:defRPr sz="2800">
-                <a:solidFill>
-                  <a:schemeClr val="tx1"/>
-                </a:solidFill>
-                <a:latin typeface="Arial" panose="020B0604020202020204" pitchFamily="34" charset="0"/>
-                <a:cs typeface="Arial" panose="020B0604020202020204" pitchFamily="34" charset="0"/>
-              </a:defRPr>
-            </a:lvl9pPr>
-          </a:lstStyle>
-          <a:p>
-            <a:pPr eaLnBrk="1" hangingPunct="1">
-              <a:spcBef>
-                <a:spcPct val="0"/>
-              </a:spcBef>
-              <a:buFontTx/>
-              <a:buNone/>
-            </a:pPr>
-            <a:endParaRPr lang="fr-FR" altLang="fr-FR" sz="2500"/>
+            <a:r>
+              <a:rPr lang="fr-FR" altLang="fr-FR" sz="700" dirty="0">
+                <a:cs typeface="Times New Roman" panose="02020603050405020304" pitchFamily="18" charset="0"/>
+              </a:rPr>
+              <a:t>: </a:t>
+            </a:r>
+            <a:r>
+              <a:rPr lang="fr-FR" altLang="fr-FR" sz="1200" dirty="0">
+                <a:latin typeface="Calibri" panose="020F0502020204030204" pitchFamily="34" charset="0"/>
+                <a:ea typeface="Calibri" panose="020F0502020204030204" pitchFamily="34" charset="0"/>
+                <a:cs typeface="Calibri" panose="020F0502020204030204" pitchFamily="34" charset="0"/>
+              </a:rPr>
+              <a:t>Machine de tri </a:t>
+            </a:r>
+            <a:endParaRPr lang="fr-FR" altLang="fr-FR" sz="700" dirty="0">
+              <a:latin typeface="Calibri" panose="020F0502020204030204" pitchFamily="34" charset="0"/>
+              <a:ea typeface="Calibri" panose="020F0502020204030204" pitchFamily="34" charset="0"/>
+              <a:cs typeface="Calibri" panose="020F0502020204030204" pitchFamily="34" charset="0"/>
+            </a:endParaRPr>
           </a:p>
         </p:txBody>
       </p:sp>
@@ -5185,8 +4914,8 @@
         </p:nvSpPr>
         <p:spPr bwMode="auto">
           <a:xfrm>
-            <a:off x="914400" y="9118600"/>
-            <a:ext cx="2133600" cy="674688"/>
+            <a:off x="533400" y="9023204"/>
+            <a:ext cx="2590800" cy="874655"/>
           </a:xfrm>
           <a:prstGeom prst="rect">
             <a:avLst/>
@@ -5216,7 +4945,7 @@
           </a:extLst>
         </p:spPr>
         <p:txBody>
-          <a:bodyPr lIns="27996" tIns="13998" rIns="27996" bIns="13998" anchor="ctr">
+          <a:bodyPr wrap="square" lIns="27996" tIns="13998" rIns="27996" bIns="13998" anchor="ctr">
             <a:spAutoFit/>
           </a:bodyPr>
           <a:lstStyle>
@@ -5359,13 +5088,10 @@
               <a:buNone/>
             </a:pPr>
             <a:r>
-              <a:rPr lang="fr-FR" altLang="fr-FR" sz="1100"/>
-              <a:t>Lyyyyyyyyyyyyyyyyyyyyyyyyyyyyyyyyyyyyyyyyyyyyyyyyyyyyyyyyyyyyyyyyyyyyyy</a:t>
+              <a:rPr lang="fr-FR" altLang="fr-FR" sz="1100" dirty="0"/>
+              <a:t>Nous avons utilisé une machine de tri comme prototype pour tester notre système. Elle nous a permis de simuler le tri de pièces et de valider les fonctionnalités de suivi et de détection.</a:t>
             </a:r>
-            <a:r>
-              <a:rPr lang="fr-FR" altLang="fr-FR" sz="900"/>
-              <a:t>yyyyyyyyyyyyyyyyyyyyyyyyyyyyyyy</a:t>
-            </a:r>
+            <a:endParaRPr lang="fr-FR" altLang="fr-FR" sz="900" dirty="0"/>
           </a:p>
         </p:txBody>
       </p:sp>
@@ -5385,10 +5111,10 @@
         </p:nvGrpSpPr>
         <p:grpSpPr bwMode="auto">
           <a:xfrm>
-            <a:off x="3505200" y="6388100"/>
-            <a:ext cx="2286000" cy="3509963"/>
-            <a:chOff x="3276600" y="6388100"/>
-            <a:chExt cx="2286000" cy="3510553"/>
+            <a:off x="3352800" y="8686799"/>
+            <a:ext cx="2590800" cy="1458477"/>
+            <a:chOff x="3209197" y="8687189"/>
+            <a:chExt cx="2392701" cy="1458723"/>
           </a:xfrm>
         </p:grpSpPr>
         <p:sp>
@@ -5407,8 +5133,8 @@
           </p:nvSpPr>
           <p:spPr bwMode="auto">
             <a:xfrm>
-              <a:off x="3352851" y="8757769"/>
-              <a:ext cx="2017730" cy="318788"/>
+              <a:off x="3352851" y="8687189"/>
+              <a:ext cx="2017730" cy="212971"/>
             </a:xfrm>
             <a:prstGeom prst="rect">
               <a:avLst/>
@@ -5581,204 +5307,26 @@
                 <a:buNone/>
               </a:pPr>
               <a:r>
-                <a:rPr lang="fr-FR" altLang="fr-FR" sz="1100">
+                <a:rPr lang="fr-FR" altLang="fr-FR" sz="1100" dirty="0" err="1">
                   <a:cs typeface="Times New Roman" panose="02020603050405020304" pitchFamily="18" charset="0"/>
                 </a:rPr>
-                <a:t>Fig 2 : </a:t>
+                <a:t>Fig</a:t>
               </a:r>
               <a:r>
-                <a:rPr lang="fr-FR" altLang="fr-FR" sz="700">
+                <a:rPr lang="fr-FR" altLang="fr-FR" sz="1100" dirty="0">
                   <a:cs typeface="Times New Roman" panose="02020603050405020304" pitchFamily="18" charset="0"/>
                 </a:rPr>
-                <a:t>………………..</a:t>
+                <a:t> 2 :</a:t>
               </a:r>
-              <a:endParaRPr lang="fr-FR" altLang="fr-FR" sz="700"/>
-            </a:p>
-          </p:txBody>
-        </p:sp>
-        <p:sp>
-          <p:nvSpPr>
-            <p:cNvPr id="2082" name="Rectangle 74">
-              <a:extLst>
-                <a:ext uri="{FF2B5EF4-FFF2-40B4-BE49-F238E27FC236}">
-                  <a16:creationId xmlns:a16="http://schemas.microsoft.com/office/drawing/2014/main" id="{D1D7624E-CB9B-0538-E650-5EF215735901}"/>
-                </a:ext>
-              </a:extLst>
-            </p:cNvPr>
-            <p:cNvSpPr>
-              <a:spLocks noChangeArrowheads="1"/>
-            </p:cNvSpPr>
-            <p:nvPr/>
-          </p:nvSpPr>
-          <p:spPr bwMode="auto">
-            <a:xfrm>
-              <a:off x="3328515" y="6388100"/>
-              <a:ext cx="2126138" cy="2151915"/>
-            </a:xfrm>
-            <a:prstGeom prst="rect">
-              <a:avLst/>
-            </a:prstGeom>
-            <a:noFill/>
-            <a:ln w="9525">
-              <a:solidFill>
-                <a:srgbClr val="002060"/>
-              </a:solidFill>
-              <a:miter lim="800000"/>
-              <a:headEnd/>
-              <a:tailEnd/>
-            </a:ln>
-            <a:extLst>
-              <a:ext uri="{909E8E84-426E-40DD-AFC4-6F175D3DCCD1}">
-                <a14:hiddenFill xmlns:a14="http://schemas.microsoft.com/office/drawing/2010/main">
-                  <a:solidFill>
-                    <a:srgbClr val="FFFFFF"/>
-                  </a:solidFill>
-                </a14:hiddenFill>
-              </a:ext>
-            </a:extLst>
-          </p:spPr>
-          <p:txBody>
-            <a:bodyPr wrap="none" lIns="31602" tIns="15801" rIns="31602" bIns="15801" anchor="ctr"/>
-            <a:lstStyle>
-              <a:lvl1pPr defTabSz="315913">
-                <a:spcBef>
-                  <a:spcPct val="20000"/>
-                </a:spcBef>
-                <a:buChar char="•"/>
-                <a:defRPr sz="4500">
-                  <a:solidFill>
-                    <a:schemeClr val="tx1"/>
-                  </a:solidFill>
-                  <a:latin typeface="Arial" panose="020B0604020202020204" pitchFamily="34" charset="0"/>
-                  <a:cs typeface="Arial" panose="020B0604020202020204" pitchFamily="34" charset="0"/>
-                </a:defRPr>
-              </a:lvl1pPr>
-              <a:lvl2pPr marL="742950" indent="-285750" defTabSz="315913">
-                <a:spcBef>
-                  <a:spcPct val="20000"/>
-                </a:spcBef>
-                <a:buChar char="–"/>
-                <a:defRPr sz="3900">
-                  <a:solidFill>
-                    <a:schemeClr val="tx1"/>
-                  </a:solidFill>
-                  <a:latin typeface="Arial" panose="020B0604020202020204" pitchFamily="34" charset="0"/>
-                  <a:cs typeface="Arial" panose="020B0604020202020204" pitchFamily="34" charset="0"/>
-                </a:defRPr>
-              </a:lvl2pPr>
-              <a:lvl3pPr marL="1143000" indent="-228600" defTabSz="315913">
-                <a:spcBef>
-                  <a:spcPct val="20000"/>
-                </a:spcBef>
-                <a:buChar char="•"/>
-                <a:defRPr sz="3400">
-                  <a:solidFill>
-                    <a:schemeClr val="tx1"/>
-                  </a:solidFill>
-                  <a:latin typeface="Arial" panose="020B0604020202020204" pitchFamily="34" charset="0"/>
-                  <a:cs typeface="Arial" panose="020B0604020202020204" pitchFamily="34" charset="0"/>
-                </a:defRPr>
-              </a:lvl3pPr>
-              <a:lvl4pPr marL="1600200" indent="-228600" defTabSz="315913">
-                <a:spcBef>
-                  <a:spcPct val="20000"/>
-                </a:spcBef>
-                <a:buChar char="–"/>
-                <a:defRPr sz="2800">
-                  <a:solidFill>
-                    <a:schemeClr val="tx1"/>
-                  </a:solidFill>
-                  <a:latin typeface="Arial" panose="020B0604020202020204" pitchFamily="34" charset="0"/>
-                  <a:cs typeface="Arial" panose="020B0604020202020204" pitchFamily="34" charset="0"/>
-                </a:defRPr>
-              </a:lvl4pPr>
-              <a:lvl5pPr marL="2057400" indent="-228600" defTabSz="315913">
-                <a:spcBef>
-                  <a:spcPct val="20000"/>
-                </a:spcBef>
-                <a:buChar char="»"/>
-                <a:defRPr sz="2800">
-                  <a:solidFill>
-                    <a:schemeClr val="tx1"/>
-                  </a:solidFill>
-                  <a:latin typeface="Arial" panose="020B0604020202020204" pitchFamily="34" charset="0"/>
-                  <a:cs typeface="Arial" panose="020B0604020202020204" pitchFamily="34" charset="0"/>
-                </a:defRPr>
-              </a:lvl5pPr>
-              <a:lvl6pPr marL="2514600" indent="-228600" defTabSz="315913" eaLnBrk="0" fontAlgn="base" hangingPunct="0">
-                <a:spcBef>
-                  <a:spcPct val="20000"/>
-                </a:spcBef>
-                <a:spcAft>
-                  <a:spcPct val="0"/>
-                </a:spcAft>
-                <a:buChar char="»"/>
-                <a:defRPr sz="2800">
-                  <a:solidFill>
-                    <a:schemeClr val="tx1"/>
-                  </a:solidFill>
-                  <a:latin typeface="Arial" panose="020B0604020202020204" pitchFamily="34" charset="0"/>
-                  <a:cs typeface="Arial" panose="020B0604020202020204" pitchFamily="34" charset="0"/>
-                </a:defRPr>
-              </a:lvl6pPr>
-              <a:lvl7pPr marL="2971800" indent="-228600" defTabSz="315913" eaLnBrk="0" fontAlgn="base" hangingPunct="0">
-                <a:spcBef>
-                  <a:spcPct val="20000"/>
-                </a:spcBef>
-                <a:spcAft>
-                  <a:spcPct val="0"/>
-                </a:spcAft>
-                <a:buChar char="»"/>
-                <a:defRPr sz="2800">
-                  <a:solidFill>
-                    <a:schemeClr val="tx1"/>
-                  </a:solidFill>
-                  <a:latin typeface="Arial" panose="020B0604020202020204" pitchFamily="34" charset="0"/>
-                  <a:cs typeface="Arial" panose="020B0604020202020204" pitchFamily="34" charset="0"/>
-                </a:defRPr>
-              </a:lvl7pPr>
-              <a:lvl8pPr marL="3429000" indent="-228600" defTabSz="315913" eaLnBrk="0" fontAlgn="base" hangingPunct="0">
-                <a:spcBef>
-                  <a:spcPct val="20000"/>
-                </a:spcBef>
-                <a:spcAft>
-                  <a:spcPct val="0"/>
-                </a:spcAft>
-                <a:buChar char="»"/>
-                <a:defRPr sz="2800">
-                  <a:solidFill>
-                    <a:schemeClr val="tx1"/>
-                  </a:solidFill>
-                  <a:latin typeface="Arial" panose="020B0604020202020204" pitchFamily="34" charset="0"/>
-                  <a:cs typeface="Arial" panose="020B0604020202020204" pitchFamily="34" charset="0"/>
-                </a:defRPr>
-              </a:lvl8pPr>
-              <a:lvl9pPr marL="3886200" indent="-228600" defTabSz="315913" eaLnBrk="0" fontAlgn="base" hangingPunct="0">
-                <a:spcBef>
-                  <a:spcPct val="20000"/>
-                </a:spcBef>
-                <a:spcAft>
-                  <a:spcPct val="0"/>
-                </a:spcAft>
-                <a:buChar char="»"/>
-                <a:defRPr sz="2800">
-                  <a:solidFill>
-                    <a:schemeClr val="tx1"/>
-                  </a:solidFill>
-                  <a:latin typeface="Arial" panose="020B0604020202020204" pitchFamily="34" charset="0"/>
-                  <a:cs typeface="Arial" panose="020B0604020202020204" pitchFamily="34" charset="0"/>
-                </a:defRPr>
-              </a:lvl9pPr>
-            </a:lstStyle>
-            <a:p>
-              <a:pPr eaLnBrk="1" hangingPunct="1">
-                <a:spcBef>
-                  <a:spcPct val="0"/>
-                </a:spcBef>
-                <a:buFontTx/>
-                <a:buNone/>
-              </a:pPr>
-              <a:endParaRPr lang="fr-FR" altLang="fr-FR" sz="2500"/>
+              <a:r>
+                <a:rPr lang="fr-FR" altLang="fr-FR" sz="1200" dirty="0">
+                  <a:latin typeface="Calibri" panose="020F0502020204030204" pitchFamily="34" charset="0"/>
+                  <a:ea typeface="Calibri" panose="020F0502020204030204" pitchFamily="34" charset="0"/>
+                  <a:cs typeface="Calibri" panose="020F0502020204030204" pitchFamily="34" charset="0"/>
+                </a:rPr>
+                <a:t> SNAP-7 Librairie </a:t>
+              </a:r>
+              <a:endParaRPr lang="fr-FR" altLang="fr-FR" sz="700" dirty="0"/>
             </a:p>
           </p:txBody>
         </p:sp>
@@ -5798,8 +5346,8 @@
           </p:nvSpPr>
           <p:spPr bwMode="auto">
             <a:xfrm>
-              <a:off x="3276600" y="9193275"/>
-              <a:ext cx="2286000" cy="705378"/>
+              <a:off x="3209197" y="8932499"/>
+              <a:ext cx="2392701" cy="1213413"/>
             </a:xfrm>
             <a:prstGeom prst="rect">
               <a:avLst/>
@@ -5829,7 +5377,7 @@
             </a:extLst>
           </p:spPr>
           <p:txBody>
-            <a:bodyPr lIns="27996" tIns="13998" rIns="27996" bIns="13998" anchor="ctr">
+            <a:bodyPr wrap="square" lIns="27996" tIns="13998" rIns="27996" bIns="13998" anchor="ctr">
               <a:spAutoFit/>
             </a:bodyPr>
             <a:lstStyle>
@@ -5972,8 +5520,8 @@
                 <a:buNone/>
               </a:pPr>
               <a:r>
-                <a:rPr lang="fr-FR" altLang="fr-FR" sz="1100"/>
-                <a:t>Lyyyyyyyyyyyyyyyyyyyyyyyyyyyyyyyyyyyyyyyyyyyyyyyyyyyyyyyyyyyyyyyyyyyyyyyyyyyyyyyyyyyyyyyyyyyyyyy</a:t>
+                <a:rPr lang="fr-FR" altLang="fr-FR" sz="1100" dirty="0"/>
+                <a:t>Nous avons utilisé la bibliothèque Snap7 pour assurer la communication entre notre application web et les automates Siemens S7-1200. Elle nous permet d’échanger des données en temps réel pour surveiller les machines.</a:t>
               </a:r>
             </a:p>
           </p:txBody>
@@ -7859,8 +7407,8 @@
         </p:nvSpPr>
         <p:spPr bwMode="auto">
           <a:xfrm>
-            <a:off x="695325" y="4385563"/>
-            <a:ext cx="8153400" cy="998537"/>
+            <a:off x="685800" y="4273477"/>
+            <a:ext cx="8153400" cy="797711"/>
           </a:xfrm>
           <a:prstGeom prst="rect">
             <a:avLst/>
@@ -8051,20 +7599,6 @@
             </a:endParaRPr>
           </a:p>
           <a:p>
-            <a:pPr algn="ctr" eaLnBrk="1" hangingPunct="1">
-              <a:spcBef>
-                <a:spcPct val="0"/>
-              </a:spcBef>
-              <a:buFontTx/>
-              <a:buNone/>
-            </a:pPr>
-            <a:endParaRPr lang="fr-FR" altLang="fr-FR" sz="1400" b="1" dirty="0">
-              <a:solidFill>
-                <a:srgbClr val="000099"/>
-              </a:solidFill>
-            </a:endParaRPr>
-          </a:p>
-          <a:p>
             <a:pPr algn="just" eaLnBrk="1" hangingPunct="1">
               <a:spcBef>
                 <a:spcPct val="0"/>
@@ -8073,20 +7607,13 @@
               <a:buNone/>
             </a:pPr>
             <a:r>
-              <a:rPr lang="fr-FR" altLang="fr-FR" sz="1200" dirty="0">
+              <a:rPr lang="fr-FR" sz="1200" dirty="0">
                 <a:latin typeface="Calibri" panose="020F0502020204030204" pitchFamily="34" charset="0"/>
+                <a:ea typeface="Calibri" panose="020F0502020204030204" pitchFamily="34" charset="0"/>
+                <a:cs typeface="Calibri" panose="020F0502020204030204" pitchFamily="34" charset="0"/>
               </a:rPr>
-              <a:t>Explique clairement la problématique, les travaux antérieurs, l’objectif du travail et la contribution du papier. La police est ‘Calibri ’, de taille 12-pts, interligne simple.</a:t>
+              <a:t>Pour améliorer la maintenance à l’usine Lear Corporation, ce projet vise à intégrer un système GMAO et SCADA. Grâce à une plateforme web développée avec Django et à la communication via Snap7 avec les automates Siemens, il centralise le suivi des machines en temps réel. Cette solution moderne optimise la réactivité et réduit les temps d’arrêt</a:t>
             </a:r>
-          </a:p>
-          <a:p>
-            <a:pPr algn="just" eaLnBrk="1" hangingPunct="1">
-              <a:spcBef>
-                <a:spcPct val="0"/>
-              </a:spcBef>
-              <a:buFontTx/>
-              <a:buNone/>
-            </a:pPr>
             <a:endParaRPr lang="fr-FR" altLang="fr-FR" sz="1100" dirty="0">
               <a:latin typeface="Calibri" panose="020F0502020204030204" pitchFamily="34" charset="0"/>
             </a:endParaRPr>
@@ -8240,7 +7767,7 @@
                 <a:latin typeface="Arial" charset="0"/>
                 <a:cs typeface="Arial" charset="0"/>
               </a:rPr>
-              <a:t>Réf : ………..</a:t>
+              <a:t>Réf : AII 08.25</a:t>
             </a:r>
           </a:p>
         </p:txBody>
@@ -8365,6 +7892,45 @@
               <a:defRPr/>
             </a:pPr>
             <a:r>
+              <a:rPr lang="fr-FR" sz="1100" b="1" dirty="0">
+                <a:ln w="1905"/>
+                <a:gradFill>
+                  <a:gsLst>
+                    <a:gs pos="0">
+                      <a:schemeClr val="accent6">
+                        <a:shade val="20000"/>
+                        <a:satMod val="200000"/>
+                      </a:schemeClr>
+                    </a:gs>
+                    <a:gs pos="78000">
+                      <a:schemeClr val="accent6">
+                        <a:tint val="90000"/>
+                        <a:shade val="89000"/>
+                        <a:satMod val="220000"/>
+                      </a:schemeClr>
+                    </a:gs>
+                    <a:gs pos="100000">
+                      <a:schemeClr val="accent6">
+                        <a:tint val="12000"/>
+                        <a:satMod val="255000"/>
+                      </a:schemeClr>
+                    </a:gs>
+                  </a:gsLst>
+                  <a:lin ang="5400000"/>
+                </a:gradFill>
+                <a:effectLst>
+                  <a:innerShdw blurRad="69850" dist="43180" dir="5400000">
+                    <a:srgbClr val="000000">
+                      <a:alpha val="65000"/>
+                    </a:srgbClr>
+                  </a:innerShdw>
+                </a:effectLst>
+                <a:latin typeface="Arial" charset="0"/>
+                <a:cs typeface="Arial" charset="0"/>
+              </a:rPr>
+              <a:t>Belkhamsa Ayhem, </a:t>
+            </a:r>
+            <a:r>
               <a:rPr lang="fr-FR" sz="1100" b="1" dirty="0" err="1">
                 <a:ln w="1905"/>
                 <a:gradFill>
@@ -8401,10 +7967,10 @@
                 <a:latin typeface="Arial" charset="0"/>
                 <a:cs typeface="Arial" charset="0"/>
               </a:rPr>
-              <a:t>Etudiant</a:t>
+              <a:t>Mhamdi</a:t>
             </a:r>
             <a:r>
-              <a:rPr lang="fr-FR" sz="1100" b="1" baseline="30000" dirty="0" err="1">
+              <a:rPr lang="fr-FR" sz="1100" b="1" dirty="0">
                 <a:ln w="1905"/>
                 <a:gradFill>
                   <a:gsLst>
@@ -8440,7 +8006,46 @@
                 <a:latin typeface="Arial" charset="0"/>
                 <a:cs typeface="Arial" charset="0"/>
               </a:rPr>
-              <a:t>a</a:t>
+              <a:t> </a:t>
+            </a:r>
+            <a:r>
+              <a:rPr lang="fr-FR" sz="1100" b="1" dirty="0" err="1">
+                <a:ln w="1905"/>
+                <a:gradFill>
+                  <a:gsLst>
+                    <a:gs pos="0">
+                      <a:schemeClr val="accent6">
+                        <a:shade val="20000"/>
+                        <a:satMod val="200000"/>
+                      </a:schemeClr>
+                    </a:gs>
+                    <a:gs pos="78000">
+                      <a:schemeClr val="accent6">
+                        <a:tint val="90000"/>
+                        <a:shade val="89000"/>
+                        <a:satMod val="220000"/>
+                      </a:schemeClr>
+                    </a:gs>
+                    <a:gs pos="100000">
+                      <a:schemeClr val="accent6">
+                        <a:tint val="12000"/>
+                        <a:satMod val="255000"/>
+                      </a:schemeClr>
+                    </a:gs>
+                  </a:gsLst>
+                  <a:lin ang="5400000"/>
+                </a:gradFill>
+                <a:effectLst>
+                  <a:innerShdw blurRad="69850" dist="43180" dir="5400000">
+                    <a:srgbClr val="000000">
+                      <a:alpha val="65000"/>
+                    </a:srgbClr>
+                  </a:innerShdw>
+                </a:effectLst>
+                <a:latin typeface="Arial" charset="0"/>
+                <a:cs typeface="Arial" charset="0"/>
+              </a:rPr>
+              <a:t>Abdelbacet</a:t>
             </a:r>
             <a:r>
               <a:rPr lang="fr-FR" sz="1100" b="1" dirty="0">
@@ -8518,46 +8123,7 @@
                 <a:latin typeface="Arial" charset="0"/>
                 <a:cs typeface="Arial" charset="0"/>
               </a:rPr>
-              <a:t>Etudiant</a:t>
-            </a:r>
-            <a:r>
-              <a:rPr lang="fr-FR" sz="1100" b="1" baseline="30000" dirty="0" err="1">
-                <a:ln w="1905"/>
-                <a:gradFill>
-                  <a:gsLst>
-                    <a:gs pos="0">
-                      <a:schemeClr val="accent6">
-                        <a:shade val="20000"/>
-                        <a:satMod val="200000"/>
-                      </a:schemeClr>
-                    </a:gs>
-                    <a:gs pos="78000">
-                      <a:schemeClr val="accent6">
-                        <a:tint val="90000"/>
-                        <a:shade val="89000"/>
-                        <a:satMod val="220000"/>
-                      </a:schemeClr>
-                    </a:gs>
-                    <a:gs pos="100000">
-                      <a:schemeClr val="accent6">
-                        <a:tint val="12000"/>
-                        <a:satMod val="255000"/>
-                      </a:schemeClr>
-                    </a:gs>
-                  </a:gsLst>
-                  <a:lin ang="5400000"/>
-                </a:gradFill>
-                <a:effectLst>
-                  <a:innerShdw blurRad="69850" dist="43180" dir="5400000">
-                    <a:srgbClr val="000000">
-                      <a:alpha val="65000"/>
-                    </a:srgbClr>
-                  </a:innerShdw>
-                </a:effectLst>
-                <a:latin typeface="Arial" charset="0"/>
-                <a:cs typeface="Arial" charset="0"/>
-              </a:rPr>
-              <a:t>b</a:t>
+              <a:t>Nahdi</a:t>
             </a:r>
             <a:r>
               <a:rPr lang="fr-FR" sz="1100" b="1" dirty="0">
@@ -8596,7 +8162,7 @@
                 <a:latin typeface="Arial" charset="0"/>
                 <a:cs typeface="Arial" charset="0"/>
               </a:rPr>
-              <a:t>, Encadreur ISET, Encadreur industriel</a:t>
+              <a:t> Mohamed</a:t>
             </a:r>
             <a:r>
               <a:rPr lang="fr-FR" sz="1100" b="1" baseline="30000" dirty="0">
@@ -8837,126 +8403,44 @@
                 <a:latin typeface="Arial" charset="0"/>
                 <a:cs typeface="Arial" charset="0"/>
               </a:rPr>
-              <a:t>E-mails : Etudiant 1</a:t>
+              <a:t>E-mails :belkhamsaayhem09@gmai.com</a:t>
             </a:r>
-            <a:r>
-              <a:rPr lang="pt-BR" sz="1000" b="1" i="1" dirty="0">
-                <a:ln w="1905"/>
-                <a:gradFill>
-                  <a:gsLst>
-                    <a:gs pos="0">
-                      <a:schemeClr val="accent6">
-                        <a:shade val="20000"/>
-                        <a:satMod val="200000"/>
-                      </a:schemeClr>
-                    </a:gs>
-                    <a:gs pos="78000">
-                      <a:schemeClr val="accent6">
-                        <a:tint val="90000"/>
-                        <a:shade val="89000"/>
-                        <a:satMod val="220000"/>
-                      </a:schemeClr>
-                    </a:gs>
-                    <a:gs pos="100000">
-                      <a:schemeClr val="accent6">
-                        <a:tint val="12000"/>
-                        <a:satMod val="255000"/>
-                      </a:schemeClr>
-                    </a:gs>
-                  </a:gsLst>
-                  <a:lin ang="5400000"/>
-                </a:gradFill>
-                <a:effectLst>
-                  <a:innerShdw blurRad="69850" dist="43180" dir="5400000">
-                    <a:srgbClr val="000000">
-                      <a:alpha val="65000"/>
-                    </a:srgbClr>
-                  </a:innerShdw>
-                </a:effectLst>
-                <a:latin typeface="Arial" charset="0"/>
-                <a:cs typeface="Arial" charset="0"/>
-                <a:hlinkClick r:id="rId2"/>
-              </a:rPr>
-              <a:t>@</a:t>
-            </a:r>
-            <a:r>
-              <a:rPr lang="pt-BR" sz="1000" b="1" i="1" dirty="0">
-                <a:ln w="1905"/>
-                <a:gradFill>
-                  <a:gsLst>
-                    <a:gs pos="0">
-                      <a:schemeClr val="accent6">
-                        <a:shade val="20000"/>
-                        <a:satMod val="200000"/>
-                      </a:schemeClr>
-                    </a:gs>
-                    <a:gs pos="78000">
-                      <a:schemeClr val="accent6">
-                        <a:tint val="90000"/>
-                        <a:shade val="89000"/>
-                        <a:satMod val="220000"/>
-                      </a:schemeClr>
-                    </a:gs>
-                    <a:gs pos="100000">
-                      <a:schemeClr val="accent6">
-                        <a:tint val="12000"/>
-                        <a:satMod val="255000"/>
-                      </a:schemeClr>
-                    </a:gs>
-                  </a:gsLst>
-                  <a:lin ang="5400000"/>
-                </a:gradFill>
-                <a:effectLst>
-                  <a:innerShdw blurRad="69850" dist="43180" dir="5400000">
-                    <a:srgbClr val="000000">
-                      <a:alpha val="65000"/>
-                    </a:srgbClr>
-                  </a:innerShdw>
-                </a:effectLst>
-                <a:latin typeface="Arial" charset="0"/>
-                <a:cs typeface="Arial" charset="0"/>
-              </a:rPr>
-              <a:t>......., Etudiant 2</a:t>
-            </a:r>
-            <a:r>
-              <a:rPr lang="pt-BR" sz="1000" b="1" i="1" u="sng" dirty="0">
-                <a:ln w="1905"/>
-                <a:gradFill>
-                  <a:gsLst>
-                    <a:gs pos="0">
-                      <a:schemeClr val="accent6">
-                        <a:shade val="20000"/>
-                        <a:satMod val="200000"/>
-                      </a:schemeClr>
-                    </a:gs>
-                    <a:gs pos="78000">
-                      <a:schemeClr val="accent6">
-                        <a:tint val="90000"/>
-                        <a:shade val="89000"/>
-                        <a:satMod val="220000"/>
-                      </a:schemeClr>
-                    </a:gs>
-                    <a:gs pos="100000">
-                      <a:schemeClr val="accent6">
-                        <a:tint val="12000"/>
-                        <a:satMod val="255000"/>
-                      </a:schemeClr>
-                    </a:gs>
-                  </a:gsLst>
-                  <a:lin ang="5400000"/>
-                </a:gradFill>
-                <a:effectLst>
-                  <a:innerShdw blurRad="69850" dist="43180" dir="5400000">
-                    <a:srgbClr val="000000">
-                      <a:alpha val="65000"/>
-                    </a:srgbClr>
-                  </a:innerShdw>
-                </a:effectLst>
-                <a:latin typeface="Arial" charset="0"/>
-                <a:cs typeface="Arial" charset="0"/>
-              </a:rPr>
-              <a:t>@.......</a:t>
-            </a:r>
+            <a:endParaRPr lang="pt-BR" sz="1000" b="1" i="1" u="sng" dirty="0">
+              <a:ln w="1905"/>
+              <a:gradFill>
+                <a:gsLst>
+                  <a:gs pos="0">
+                    <a:schemeClr val="accent6">
+                      <a:shade val="20000"/>
+                      <a:satMod val="200000"/>
+                    </a:schemeClr>
+                  </a:gs>
+                  <a:gs pos="78000">
+                    <a:schemeClr val="accent6">
+                      <a:tint val="90000"/>
+                      <a:shade val="89000"/>
+                      <a:satMod val="220000"/>
+                    </a:schemeClr>
+                  </a:gs>
+                  <a:gs pos="100000">
+                    <a:schemeClr val="accent6">
+                      <a:tint val="12000"/>
+                      <a:satMod val="255000"/>
+                    </a:schemeClr>
+                  </a:gs>
+                </a:gsLst>
+                <a:lin ang="5400000"/>
+              </a:gradFill>
+              <a:effectLst>
+                <a:innerShdw blurRad="69850" dist="43180" dir="5400000">
+                  <a:srgbClr val="000000">
+                    <a:alpha val="65000"/>
+                  </a:srgbClr>
+                </a:innerShdw>
+              </a:effectLst>
+              <a:latin typeface="Arial" charset="0"/>
+              <a:cs typeface="Arial" charset="0"/>
+            </a:endParaRPr>
           </a:p>
         </p:txBody>
       </p:sp>
@@ -8975,7 +8459,7 @@
           <p:nvPr/>
         </p:nvPicPr>
         <p:blipFill>
-          <a:blip r:embed="rId3">
+          <a:blip r:embed="rId2">
             <a:extLst>
               <a:ext uri="{28A0092B-C50C-407E-A947-70E740481C1C}">
                 <a14:useLocalDpi xmlns:a14="http://schemas.microsoft.com/office/drawing/2010/main" val="0"/>
@@ -8989,7 +8473,7 @@
         </p:blipFill>
         <p:spPr bwMode="auto">
           <a:xfrm>
-            <a:off x="762000" y="762000"/>
+            <a:off x="762000" y="508000"/>
             <a:ext cx="1066800" cy="1244600"/>
           </a:xfrm>
           <a:prstGeom prst="rect">
@@ -9020,381 +8504,6 @@
           </a:extLst>
         </p:spPr>
       </p:pic>
-      <p:sp>
-        <p:nvSpPr>
-          <p:cNvPr id="2074" name="Rectangle 48">
-            <a:extLst>
-              <a:ext uri="{FF2B5EF4-FFF2-40B4-BE49-F238E27FC236}">
-                <a16:creationId xmlns:a16="http://schemas.microsoft.com/office/drawing/2014/main" id="{8BBEC550-6938-1280-C2B7-9445C3A89F4E}"/>
-              </a:ext>
-            </a:extLst>
-          </p:cNvPr>
-          <p:cNvSpPr>
-            <a:spLocks noChangeArrowheads="1"/>
-          </p:cNvSpPr>
-          <p:nvPr/>
-        </p:nvSpPr>
-        <p:spPr bwMode="auto">
-          <a:xfrm>
-            <a:off x="7696200" y="838200"/>
-            <a:ext cx="1066800" cy="1066800"/>
-          </a:xfrm>
-          <a:prstGeom prst="rect">
-            <a:avLst/>
-          </a:prstGeom>
-          <a:solidFill>
-            <a:schemeClr val="accent1"/>
-          </a:solidFill>
-          <a:ln w="9525">
-            <a:solidFill>
-              <a:schemeClr val="tx1"/>
-            </a:solidFill>
-            <a:miter lim="800000"/>
-            <a:headEnd/>
-            <a:tailEnd/>
-          </a:ln>
-        </p:spPr>
-        <p:txBody>
-          <a:bodyPr wrap="none" anchor="ctr"/>
-          <a:lstStyle>
-            <a:lvl1pPr>
-              <a:spcBef>
-                <a:spcPct val="20000"/>
-              </a:spcBef>
-              <a:buChar char="•"/>
-              <a:defRPr sz="4500">
-                <a:solidFill>
-                  <a:schemeClr val="tx1"/>
-                </a:solidFill>
-                <a:latin typeface="Arial" panose="020B0604020202020204" pitchFamily="34" charset="0"/>
-                <a:cs typeface="Arial" panose="020B0604020202020204" pitchFamily="34" charset="0"/>
-              </a:defRPr>
-            </a:lvl1pPr>
-            <a:lvl2pPr marL="742950" indent="-285750">
-              <a:spcBef>
-                <a:spcPct val="20000"/>
-              </a:spcBef>
-              <a:buChar char="–"/>
-              <a:defRPr sz="3900">
-                <a:solidFill>
-                  <a:schemeClr val="tx1"/>
-                </a:solidFill>
-                <a:latin typeface="Arial" panose="020B0604020202020204" pitchFamily="34" charset="0"/>
-                <a:cs typeface="Arial" panose="020B0604020202020204" pitchFamily="34" charset="0"/>
-              </a:defRPr>
-            </a:lvl2pPr>
-            <a:lvl3pPr marL="1143000" indent="-228600">
-              <a:spcBef>
-                <a:spcPct val="20000"/>
-              </a:spcBef>
-              <a:buChar char="•"/>
-              <a:defRPr sz="3400">
-                <a:solidFill>
-                  <a:schemeClr val="tx1"/>
-                </a:solidFill>
-                <a:latin typeface="Arial" panose="020B0604020202020204" pitchFamily="34" charset="0"/>
-                <a:cs typeface="Arial" panose="020B0604020202020204" pitchFamily="34" charset="0"/>
-              </a:defRPr>
-            </a:lvl3pPr>
-            <a:lvl4pPr marL="1600200" indent="-228600">
-              <a:spcBef>
-                <a:spcPct val="20000"/>
-              </a:spcBef>
-              <a:buChar char="–"/>
-              <a:defRPr sz="2800">
-                <a:solidFill>
-                  <a:schemeClr val="tx1"/>
-                </a:solidFill>
-                <a:latin typeface="Arial" panose="020B0604020202020204" pitchFamily="34" charset="0"/>
-                <a:cs typeface="Arial" panose="020B0604020202020204" pitchFamily="34" charset="0"/>
-              </a:defRPr>
-            </a:lvl4pPr>
-            <a:lvl5pPr marL="2057400" indent="-228600">
-              <a:spcBef>
-                <a:spcPct val="20000"/>
-              </a:spcBef>
-              <a:buChar char="»"/>
-              <a:defRPr sz="2800">
-                <a:solidFill>
-                  <a:schemeClr val="tx1"/>
-                </a:solidFill>
-                <a:latin typeface="Arial" panose="020B0604020202020204" pitchFamily="34" charset="0"/>
-                <a:cs typeface="Arial" panose="020B0604020202020204" pitchFamily="34" charset="0"/>
-              </a:defRPr>
-            </a:lvl5pPr>
-            <a:lvl6pPr marL="2514600" indent="-228600" eaLnBrk="0" fontAlgn="base" hangingPunct="0">
-              <a:spcBef>
-                <a:spcPct val="20000"/>
-              </a:spcBef>
-              <a:spcAft>
-                <a:spcPct val="0"/>
-              </a:spcAft>
-              <a:buChar char="»"/>
-              <a:defRPr sz="2800">
-                <a:solidFill>
-                  <a:schemeClr val="tx1"/>
-                </a:solidFill>
-                <a:latin typeface="Arial" panose="020B0604020202020204" pitchFamily="34" charset="0"/>
-                <a:cs typeface="Arial" panose="020B0604020202020204" pitchFamily="34" charset="0"/>
-              </a:defRPr>
-            </a:lvl6pPr>
-            <a:lvl7pPr marL="2971800" indent="-228600" eaLnBrk="0" fontAlgn="base" hangingPunct="0">
-              <a:spcBef>
-                <a:spcPct val="20000"/>
-              </a:spcBef>
-              <a:spcAft>
-                <a:spcPct val="0"/>
-              </a:spcAft>
-              <a:buChar char="»"/>
-              <a:defRPr sz="2800">
-                <a:solidFill>
-                  <a:schemeClr val="tx1"/>
-                </a:solidFill>
-                <a:latin typeface="Arial" panose="020B0604020202020204" pitchFamily="34" charset="0"/>
-                <a:cs typeface="Arial" panose="020B0604020202020204" pitchFamily="34" charset="0"/>
-              </a:defRPr>
-            </a:lvl7pPr>
-            <a:lvl8pPr marL="3429000" indent="-228600" eaLnBrk="0" fontAlgn="base" hangingPunct="0">
-              <a:spcBef>
-                <a:spcPct val="20000"/>
-              </a:spcBef>
-              <a:spcAft>
-                <a:spcPct val="0"/>
-              </a:spcAft>
-              <a:buChar char="»"/>
-              <a:defRPr sz="2800">
-                <a:solidFill>
-                  <a:schemeClr val="tx1"/>
-                </a:solidFill>
-                <a:latin typeface="Arial" panose="020B0604020202020204" pitchFamily="34" charset="0"/>
-                <a:cs typeface="Arial" panose="020B0604020202020204" pitchFamily="34" charset="0"/>
-              </a:defRPr>
-            </a:lvl8pPr>
-            <a:lvl9pPr marL="3886200" indent="-228600" eaLnBrk="0" fontAlgn="base" hangingPunct="0">
-              <a:spcBef>
-                <a:spcPct val="20000"/>
-              </a:spcBef>
-              <a:spcAft>
-                <a:spcPct val="0"/>
-              </a:spcAft>
-              <a:buChar char="»"/>
-              <a:defRPr sz="2800">
-                <a:solidFill>
-                  <a:schemeClr val="tx1"/>
-                </a:solidFill>
-                <a:latin typeface="Arial" panose="020B0604020202020204" pitchFamily="34" charset="0"/>
-                <a:cs typeface="Arial" panose="020B0604020202020204" pitchFamily="34" charset="0"/>
-              </a:defRPr>
-            </a:lvl9pPr>
-          </a:lstStyle>
-          <a:p>
-            <a:pPr eaLnBrk="1" hangingPunct="1">
-              <a:spcBef>
-                <a:spcPct val="0"/>
-              </a:spcBef>
-              <a:buFontTx/>
-              <a:buNone/>
-            </a:pPr>
-            <a:endParaRPr lang="fr-FR" altLang="fr-FR" sz="2500"/>
-          </a:p>
-        </p:txBody>
-      </p:sp>
-      <p:sp>
-        <p:nvSpPr>
-          <p:cNvPr id="2075" name="ZoneTexte 48">
-            <a:extLst>
-              <a:ext uri="{FF2B5EF4-FFF2-40B4-BE49-F238E27FC236}">
-                <a16:creationId xmlns:a16="http://schemas.microsoft.com/office/drawing/2014/main" id="{56C481E1-EBD8-7A4B-C6DD-42CC60A5F1A2}"/>
-              </a:ext>
-            </a:extLst>
-          </p:cNvPr>
-          <p:cNvSpPr txBox="1">
-            <a:spLocks noChangeArrowheads="1"/>
-          </p:cNvSpPr>
-          <p:nvPr/>
-        </p:nvSpPr>
-        <p:spPr bwMode="auto">
-          <a:xfrm>
-            <a:off x="7848600" y="1143000"/>
-            <a:ext cx="838200" cy="396875"/>
-          </a:xfrm>
-          <a:prstGeom prst="rect">
-            <a:avLst/>
-          </a:prstGeom>
-          <a:noFill/>
-          <a:ln>
-            <a:noFill/>
-          </a:ln>
-          <a:extLst>
-            <a:ext uri="{909E8E84-426E-40DD-AFC4-6F175D3DCCD1}">
-              <a14:hiddenFill xmlns:a14="http://schemas.microsoft.com/office/drawing/2010/main">
-                <a:solidFill>
-                  <a:srgbClr val="FFFFFF"/>
-                </a:solidFill>
-              </a14:hiddenFill>
-            </a:ext>
-            <a:ext uri="{91240B29-F687-4F45-9708-019B960494DF}">
-              <a14:hiddenLine xmlns:a14="http://schemas.microsoft.com/office/drawing/2010/main" w="9525">
-                <a:solidFill>
-                  <a:srgbClr val="000000"/>
-                </a:solidFill>
-                <a:miter lim="800000"/>
-                <a:headEnd/>
-                <a:tailEnd/>
-              </a14:hiddenLine>
-            </a:ext>
-          </a:extLst>
-        </p:spPr>
-        <p:txBody>
-          <a:bodyPr>
-            <a:spAutoFit/>
-          </a:bodyPr>
-          <a:lstStyle>
-            <a:lvl1pPr>
-              <a:spcBef>
-                <a:spcPct val="20000"/>
-              </a:spcBef>
-              <a:buChar char="•"/>
-              <a:defRPr sz="4500">
-                <a:solidFill>
-                  <a:schemeClr val="tx1"/>
-                </a:solidFill>
-                <a:latin typeface="Arial" panose="020B0604020202020204" pitchFamily="34" charset="0"/>
-                <a:cs typeface="Arial" panose="020B0604020202020204" pitchFamily="34" charset="0"/>
-              </a:defRPr>
-            </a:lvl1pPr>
-            <a:lvl2pPr marL="742950" indent="-285750">
-              <a:spcBef>
-                <a:spcPct val="20000"/>
-              </a:spcBef>
-              <a:buChar char="–"/>
-              <a:defRPr sz="3900">
-                <a:solidFill>
-                  <a:schemeClr val="tx1"/>
-                </a:solidFill>
-                <a:latin typeface="Arial" panose="020B0604020202020204" pitchFamily="34" charset="0"/>
-                <a:cs typeface="Arial" panose="020B0604020202020204" pitchFamily="34" charset="0"/>
-              </a:defRPr>
-            </a:lvl2pPr>
-            <a:lvl3pPr marL="1143000" indent="-228600">
-              <a:spcBef>
-                <a:spcPct val="20000"/>
-              </a:spcBef>
-              <a:buChar char="•"/>
-              <a:defRPr sz="3400">
-                <a:solidFill>
-                  <a:schemeClr val="tx1"/>
-                </a:solidFill>
-                <a:latin typeface="Arial" panose="020B0604020202020204" pitchFamily="34" charset="0"/>
-                <a:cs typeface="Arial" panose="020B0604020202020204" pitchFamily="34" charset="0"/>
-              </a:defRPr>
-            </a:lvl3pPr>
-            <a:lvl4pPr marL="1600200" indent="-228600">
-              <a:spcBef>
-                <a:spcPct val="20000"/>
-              </a:spcBef>
-              <a:buChar char="–"/>
-              <a:defRPr sz="2800">
-                <a:solidFill>
-                  <a:schemeClr val="tx1"/>
-                </a:solidFill>
-                <a:latin typeface="Arial" panose="020B0604020202020204" pitchFamily="34" charset="0"/>
-                <a:cs typeface="Arial" panose="020B0604020202020204" pitchFamily="34" charset="0"/>
-              </a:defRPr>
-            </a:lvl4pPr>
-            <a:lvl5pPr marL="2057400" indent="-228600">
-              <a:spcBef>
-                <a:spcPct val="20000"/>
-              </a:spcBef>
-              <a:buChar char="»"/>
-              <a:defRPr sz="2800">
-                <a:solidFill>
-                  <a:schemeClr val="tx1"/>
-                </a:solidFill>
-                <a:latin typeface="Arial" panose="020B0604020202020204" pitchFamily="34" charset="0"/>
-                <a:cs typeface="Arial" panose="020B0604020202020204" pitchFamily="34" charset="0"/>
-              </a:defRPr>
-            </a:lvl5pPr>
-            <a:lvl6pPr marL="2514600" indent="-228600" eaLnBrk="0" fontAlgn="base" hangingPunct="0">
-              <a:spcBef>
-                <a:spcPct val="20000"/>
-              </a:spcBef>
-              <a:spcAft>
-                <a:spcPct val="0"/>
-              </a:spcAft>
-              <a:buChar char="»"/>
-              <a:defRPr sz="2800">
-                <a:solidFill>
-                  <a:schemeClr val="tx1"/>
-                </a:solidFill>
-                <a:latin typeface="Arial" panose="020B0604020202020204" pitchFamily="34" charset="0"/>
-                <a:cs typeface="Arial" panose="020B0604020202020204" pitchFamily="34" charset="0"/>
-              </a:defRPr>
-            </a:lvl6pPr>
-            <a:lvl7pPr marL="2971800" indent="-228600" eaLnBrk="0" fontAlgn="base" hangingPunct="0">
-              <a:spcBef>
-                <a:spcPct val="20000"/>
-              </a:spcBef>
-              <a:spcAft>
-                <a:spcPct val="0"/>
-              </a:spcAft>
-              <a:buChar char="»"/>
-              <a:defRPr sz="2800">
-                <a:solidFill>
-                  <a:schemeClr val="tx1"/>
-                </a:solidFill>
-                <a:latin typeface="Arial" panose="020B0604020202020204" pitchFamily="34" charset="0"/>
-                <a:cs typeface="Arial" panose="020B0604020202020204" pitchFamily="34" charset="0"/>
-              </a:defRPr>
-            </a:lvl7pPr>
-            <a:lvl8pPr marL="3429000" indent="-228600" eaLnBrk="0" fontAlgn="base" hangingPunct="0">
-              <a:spcBef>
-                <a:spcPct val="20000"/>
-              </a:spcBef>
-              <a:spcAft>
-                <a:spcPct val="0"/>
-              </a:spcAft>
-              <a:buChar char="»"/>
-              <a:defRPr sz="2800">
-                <a:solidFill>
-                  <a:schemeClr val="tx1"/>
-                </a:solidFill>
-                <a:latin typeface="Arial" panose="020B0604020202020204" pitchFamily="34" charset="0"/>
-                <a:cs typeface="Arial" panose="020B0604020202020204" pitchFamily="34" charset="0"/>
-              </a:defRPr>
-            </a:lvl8pPr>
-            <a:lvl9pPr marL="3886200" indent="-228600" eaLnBrk="0" fontAlgn="base" hangingPunct="0">
-              <a:spcBef>
-                <a:spcPct val="20000"/>
-              </a:spcBef>
-              <a:spcAft>
-                <a:spcPct val="0"/>
-              </a:spcAft>
-              <a:buChar char="»"/>
-              <a:defRPr sz="2800">
-                <a:solidFill>
-                  <a:schemeClr val="tx1"/>
-                </a:solidFill>
-                <a:latin typeface="Arial" panose="020B0604020202020204" pitchFamily="34" charset="0"/>
-                <a:cs typeface="Arial" panose="020B0604020202020204" pitchFamily="34" charset="0"/>
-              </a:defRPr>
-            </a:lvl9pPr>
-          </a:lstStyle>
-          <a:p>
-            <a:pPr algn="ctr" eaLnBrk="1" hangingPunct="1">
-              <a:spcBef>
-                <a:spcPct val="0"/>
-              </a:spcBef>
-              <a:buFontTx/>
-              <a:buNone/>
-            </a:pPr>
-            <a:r>
-              <a:rPr lang="fr-FR" altLang="fr-FR" sz="1000"/>
-              <a:t>Sigle de l’entreprise</a:t>
-            </a:r>
-          </a:p>
-        </p:txBody>
-      </p:sp>
       <p:grpSp>
         <p:nvGrpSpPr>
           <p:cNvPr id="2076" name="Groupe 39">
@@ -9411,10 +8520,10 @@
         </p:nvGrpSpPr>
         <p:grpSpPr bwMode="auto">
           <a:xfrm>
-            <a:off x="6172200" y="6396038"/>
-            <a:ext cx="2286000" cy="3509962"/>
-            <a:chOff x="3276600" y="6388100"/>
-            <a:chExt cx="2286000" cy="3510553"/>
+            <a:off x="6075362" y="8686799"/>
+            <a:ext cx="2590800" cy="1373835"/>
+            <a:chOff x="3179762" y="8679250"/>
+            <a:chExt cx="2590800" cy="1374067"/>
           </a:xfrm>
         </p:grpSpPr>
         <p:sp>
@@ -9433,8 +8542,8 @@
           </p:nvSpPr>
           <p:spPr bwMode="auto">
             <a:xfrm>
-              <a:off x="3352851" y="8757769"/>
-              <a:ext cx="2017730" cy="197547"/>
+              <a:off x="3249626" y="8679250"/>
+              <a:ext cx="2362149" cy="212971"/>
             </a:xfrm>
             <a:prstGeom prst="rect">
               <a:avLst/>
@@ -9464,7 +8573,7 @@
             </a:extLst>
           </p:spPr>
           <p:txBody>
-            <a:bodyPr lIns="27996" tIns="13998" rIns="27996" bIns="13998" anchor="ctr">
+            <a:bodyPr wrap="square" lIns="27996" tIns="13998" rIns="27996" bIns="13998" anchor="ctr">
               <a:spAutoFit/>
             </a:bodyPr>
             <a:lstStyle>
@@ -9607,204 +8716,34 @@
                 <a:buNone/>
               </a:pPr>
               <a:r>
-                <a:rPr lang="fr-FR" altLang="fr-FR" sz="1100">
+                <a:rPr lang="fr-FR" altLang="fr-FR" sz="1100" dirty="0" err="1">
                   <a:cs typeface="Times New Roman" panose="02020603050405020304" pitchFamily="18" charset="0"/>
                 </a:rPr>
-                <a:t>Fig 3: </a:t>
+                <a:t>Fig</a:t>
               </a:r>
               <a:r>
-                <a:rPr lang="fr-FR" altLang="fr-FR" sz="700">
+                <a:rPr lang="fr-FR" altLang="fr-FR" sz="1100" dirty="0">
                   <a:cs typeface="Times New Roman" panose="02020603050405020304" pitchFamily="18" charset="0"/>
                 </a:rPr>
-                <a:t>………………..</a:t>
+                <a:t> 3:</a:t>
               </a:r>
-              <a:endParaRPr lang="fr-FR" altLang="fr-FR" sz="700"/>
-            </a:p>
-          </p:txBody>
-        </p:sp>
-        <p:sp>
-          <p:nvSpPr>
-            <p:cNvPr id="2079" name="Rectangle 74">
-              <a:extLst>
-                <a:ext uri="{FF2B5EF4-FFF2-40B4-BE49-F238E27FC236}">
-                  <a16:creationId xmlns:a16="http://schemas.microsoft.com/office/drawing/2014/main" id="{01D0AF01-7BD5-896E-2F11-AD44771AA6BE}"/>
-                </a:ext>
-              </a:extLst>
-            </p:cNvPr>
-            <p:cNvSpPr>
-              <a:spLocks noChangeArrowheads="1"/>
-            </p:cNvSpPr>
-            <p:nvPr/>
-          </p:nvSpPr>
-          <p:spPr bwMode="auto">
-            <a:xfrm>
-              <a:off x="3328515" y="6388100"/>
-              <a:ext cx="2126138" cy="2151915"/>
-            </a:xfrm>
-            <a:prstGeom prst="rect">
-              <a:avLst/>
-            </a:prstGeom>
-            <a:noFill/>
-            <a:ln w="9525">
-              <a:solidFill>
-                <a:schemeClr val="tx1"/>
-              </a:solidFill>
-              <a:miter lim="800000"/>
-              <a:headEnd/>
-              <a:tailEnd/>
-            </a:ln>
-            <a:extLst>
-              <a:ext uri="{909E8E84-426E-40DD-AFC4-6F175D3DCCD1}">
-                <a14:hiddenFill xmlns:a14="http://schemas.microsoft.com/office/drawing/2010/main">
-                  <a:solidFill>
-                    <a:srgbClr val="FFFFFF"/>
-                  </a:solidFill>
-                </a14:hiddenFill>
-              </a:ext>
-            </a:extLst>
-          </p:spPr>
-          <p:txBody>
-            <a:bodyPr wrap="none" lIns="31602" tIns="15801" rIns="31602" bIns="15801" anchor="ctr"/>
-            <a:lstStyle>
-              <a:lvl1pPr defTabSz="315913">
-                <a:spcBef>
-                  <a:spcPct val="20000"/>
-                </a:spcBef>
-                <a:buChar char="•"/>
-                <a:defRPr sz="4500">
-                  <a:solidFill>
-                    <a:schemeClr val="tx1"/>
-                  </a:solidFill>
-                  <a:latin typeface="Arial" panose="020B0604020202020204" pitchFamily="34" charset="0"/>
-                  <a:cs typeface="Arial" panose="020B0604020202020204" pitchFamily="34" charset="0"/>
-                </a:defRPr>
-              </a:lvl1pPr>
-              <a:lvl2pPr marL="742950" indent="-285750" defTabSz="315913">
-                <a:spcBef>
-                  <a:spcPct val="20000"/>
-                </a:spcBef>
-                <a:buChar char="–"/>
-                <a:defRPr sz="3900">
-                  <a:solidFill>
-                    <a:schemeClr val="tx1"/>
-                  </a:solidFill>
-                  <a:latin typeface="Arial" panose="020B0604020202020204" pitchFamily="34" charset="0"/>
-                  <a:cs typeface="Arial" panose="020B0604020202020204" pitchFamily="34" charset="0"/>
-                </a:defRPr>
-              </a:lvl2pPr>
-              <a:lvl3pPr marL="1143000" indent="-228600" defTabSz="315913">
-                <a:spcBef>
-                  <a:spcPct val="20000"/>
-                </a:spcBef>
-                <a:buChar char="•"/>
-                <a:defRPr sz="3400">
-                  <a:solidFill>
-                    <a:schemeClr val="tx1"/>
-                  </a:solidFill>
-                  <a:latin typeface="Arial" panose="020B0604020202020204" pitchFamily="34" charset="0"/>
-                  <a:cs typeface="Arial" panose="020B0604020202020204" pitchFamily="34" charset="0"/>
-                </a:defRPr>
-              </a:lvl3pPr>
-              <a:lvl4pPr marL="1600200" indent="-228600" defTabSz="315913">
-                <a:spcBef>
-                  <a:spcPct val="20000"/>
-                </a:spcBef>
-                <a:buChar char="–"/>
-                <a:defRPr sz="2800">
-                  <a:solidFill>
-                    <a:schemeClr val="tx1"/>
-                  </a:solidFill>
-                  <a:latin typeface="Arial" panose="020B0604020202020204" pitchFamily="34" charset="0"/>
-                  <a:cs typeface="Arial" panose="020B0604020202020204" pitchFamily="34" charset="0"/>
-                </a:defRPr>
-              </a:lvl4pPr>
-              <a:lvl5pPr marL="2057400" indent="-228600" defTabSz="315913">
-                <a:spcBef>
-                  <a:spcPct val="20000"/>
-                </a:spcBef>
-                <a:buChar char="»"/>
-                <a:defRPr sz="2800">
-                  <a:solidFill>
-                    <a:schemeClr val="tx1"/>
-                  </a:solidFill>
-                  <a:latin typeface="Arial" panose="020B0604020202020204" pitchFamily="34" charset="0"/>
-                  <a:cs typeface="Arial" panose="020B0604020202020204" pitchFamily="34" charset="0"/>
-                </a:defRPr>
-              </a:lvl5pPr>
-              <a:lvl6pPr marL="2514600" indent="-228600" defTabSz="315913" eaLnBrk="0" fontAlgn="base" hangingPunct="0">
-                <a:spcBef>
-                  <a:spcPct val="20000"/>
-                </a:spcBef>
-                <a:spcAft>
-                  <a:spcPct val="0"/>
-                </a:spcAft>
-                <a:buChar char="»"/>
-                <a:defRPr sz="2800">
-                  <a:solidFill>
-                    <a:schemeClr val="tx1"/>
-                  </a:solidFill>
-                  <a:latin typeface="Arial" panose="020B0604020202020204" pitchFamily="34" charset="0"/>
-                  <a:cs typeface="Arial" panose="020B0604020202020204" pitchFamily="34" charset="0"/>
-                </a:defRPr>
-              </a:lvl6pPr>
-              <a:lvl7pPr marL="2971800" indent="-228600" defTabSz="315913" eaLnBrk="0" fontAlgn="base" hangingPunct="0">
-                <a:spcBef>
-                  <a:spcPct val="20000"/>
-                </a:spcBef>
-                <a:spcAft>
-                  <a:spcPct val="0"/>
-                </a:spcAft>
-                <a:buChar char="»"/>
-                <a:defRPr sz="2800">
-                  <a:solidFill>
-                    <a:schemeClr val="tx1"/>
-                  </a:solidFill>
-                  <a:latin typeface="Arial" panose="020B0604020202020204" pitchFamily="34" charset="0"/>
-                  <a:cs typeface="Arial" panose="020B0604020202020204" pitchFamily="34" charset="0"/>
-                </a:defRPr>
-              </a:lvl7pPr>
-              <a:lvl8pPr marL="3429000" indent="-228600" defTabSz="315913" eaLnBrk="0" fontAlgn="base" hangingPunct="0">
-                <a:spcBef>
-                  <a:spcPct val="20000"/>
-                </a:spcBef>
-                <a:spcAft>
-                  <a:spcPct val="0"/>
-                </a:spcAft>
-                <a:buChar char="»"/>
-                <a:defRPr sz="2800">
-                  <a:solidFill>
-                    <a:schemeClr val="tx1"/>
-                  </a:solidFill>
-                  <a:latin typeface="Arial" panose="020B0604020202020204" pitchFamily="34" charset="0"/>
-                  <a:cs typeface="Arial" panose="020B0604020202020204" pitchFamily="34" charset="0"/>
-                </a:defRPr>
-              </a:lvl8pPr>
-              <a:lvl9pPr marL="3886200" indent="-228600" defTabSz="315913" eaLnBrk="0" fontAlgn="base" hangingPunct="0">
-                <a:spcBef>
-                  <a:spcPct val="20000"/>
-                </a:spcBef>
-                <a:spcAft>
-                  <a:spcPct val="0"/>
-                </a:spcAft>
-                <a:buChar char="»"/>
-                <a:defRPr sz="2800">
-                  <a:solidFill>
-                    <a:schemeClr val="tx1"/>
-                  </a:solidFill>
-                  <a:latin typeface="Arial" panose="020B0604020202020204" pitchFamily="34" charset="0"/>
-                  <a:cs typeface="Arial" panose="020B0604020202020204" pitchFamily="34" charset="0"/>
-                </a:defRPr>
-              </a:lvl9pPr>
-            </a:lstStyle>
-            <a:p>
-              <a:pPr eaLnBrk="1" hangingPunct="1">
-                <a:spcBef>
-                  <a:spcPct val="0"/>
-                </a:spcBef>
-                <a:buFontTx/>
-                <a:buNone/>
-              </a:pPr>
-              <a:endParaRPr lang="fr-FR" altLang="fr-FR" sz="2500"/>
+              <a:r>
+                <a:rPr lang="fr-FR" altLang="fr-FR" sz="1200" dirty="0">
+                  <a:latin typeface="Calibri" panose="020F0502020204030204" pitchFamily="34" charset="0"/>
+                  <a:ea typeface="Calibri" panose="020F0502020204030204" pitchFamily="34" charset="0"/>
+                  <a:cs typeface="Calibri" panose="020F0502020204030204" pitchFamily="34" charset="0"/>
+                </a:rPr>
+                <a:t> Page d’accueil d’</a:t>
+              </a:r>
+              <a:r>
+                <a:rPr lang="fr-FR" altLang="fr-FR" sz="1200" dirty="0" err="1">
+                  <a:latin typeface="Calibri" panose="020F0502020204030204" pitchFamily="34" charset="0"/>
+                  <a:ea typeface="Calibri" panose="020F0502020204030204" pitchFamily="34" charset="0"/>
+                  <a:cs typeface="Calibri" panose="020F0502020204030204" pitchFamily="34" charset="0"/>
+                </a:rPr>
+                <a:t>adminstrateur</a:t>
+              </a:r>
+              <a:endParaRPr lang="fr-FR" altLang="fr-FR" sz="700" dirty="0"/>
             </a:p>
           </p:txBody>
         </p:sp>
@@ -9824,8 +8763,8 @@
           </p:nvSpPr>
           <p:spPr bwMode="auto">
             <a:xfrm>
-              <a:off x="3276600" y="9193275"/>
-              <a:ext cx="2286000" cy="705378"/>
+              <a:off x="3179762" y="9009209"/>
+              <a:ext cx="2590800" cy="1044108"/>
             </a:xfrm>
             <a:prstGeom prst="rect">
               <a:avLst/>
@@ -9855,7 +8794,7 @@
             </a:extLst>
           </p:spPr>
           <p:txBody>
-            <a:bodyPr lIns="27996" tIns="13998" rIns="27996" bIns="13998" anchor="ctr">
+            <a:bodyPr wrap="square" lIns="27996" tIns="13998" rIns="27996" bIns="13998" anchor="ctr">
               <a:spAutoFit/>
             </a:bodyPr>
             <a:lstStyle>
@@ -9998,8 +8937,8 @@
                 <a:buNone/>
               </a:pPr>
               <a:r>
-                <a:rPr lang="fr-FR" altLang="fr-FR" sz="1100"/>
-                <a:t>Lyyyyyyyyyyyyyyyyyyyyyyyyyyyyyyyyyyyyyyyyyyyyyyyyyyyyyyyyyyyyyyyyyyyyyyyyyyyyyyyyyyyyyyyyyyyyyyy</a:t>
+                <a:rPr lang="fr-FR" altLang="fr-FR" sz="1100" dirty="0"/>
+                <a:t>Nous avons conçu une page d’accueil dédiée à l’administrateur qui affiche les statistiques de maintenance, les alertes et les interventions. Elle nous permet de centraliser toutes les informations utiles dans une interface claire.</a:t>
               </a:r>
             </a:p>
           </p:txBody>
@@ -10021,8 +8960,8 @@
         </p:nvSpPr>
         <p:spPr bwMode="auto">
           <a:xfrm>
-            <a:off x="695325" y="11125200"/>
-            <a:ext cx="8153400" cy="930275"/>
+            <a:off x="633664" y="11231158"/>
+            <a:ext cx="8153400" cy="970707"/>
           </a:xfrm>
           <a:prstGeom prst="rect">
             <a:avLst/>
@@ -10088,35 +9027,158 @@
               <a:defRPr/>
             </a:pPr>
             <a:r>
-              <a:rPr lang="fr-FR" sz="1100" dirty="0">
+              <a:rPr lang="fr-FR" sz="1200" dirty="0">
                 <a:latin typeface="Calibri" pitchFamily="34" charset="0"/>
                 <a:cs typeface="Arial" charset="0"/>
               </a:rPr>
-              <a:t>La perspective doit rapporter la suite et les applications possibles à réaliser du présent travail. La police est ‘Calibri ’, de taille 12-pts, interligne simple.</a:t>
+              <a:t>Ce système pourra être étendu avec des modules d’analyse prédictive basés sur l’intelligence artificielle. L’intégration de capteurs IoT supplémentaires améliorerait le suivi en temps réel. Enfin, l’interface web pourrait évoluer vers une application mobile pour une accessibilité renforcée.</a:t>
             </a:r>
-          </a:p>
-          <a:p>
-            <a:pPr marL="155575" indent="-58738" algn="ctr" eaLnBrk="1" fontAlgn="auto" hangingPunct="1">
-              <a:lnSpc>
-                <a:spcPct val="120000"/>
-              </a:lnSpc>
-              <a:spcBef>
-                <a:spcPts val="0"/>
-              </a:spcBef>
-              <a:spcAft>
-                <a:spcPts val="0"/>
-              </a:spcAft>
-              <a:buFont typeface="Wingdings 2"/>
-              <a:buNone/>
-              <a:defRPr/>
-            </a:pPr>
-            <a:endParaRPr lang="fr-FR" sz="1100" dirty="0">
-              <a:latin typeface="Calibri" pitchFamily="34" charset="0"/>
-              <a:cs typeface="Arial" charset="0"/>
-            </a:endParaRPr>
           </a:p>
         </p:txBody>
       </p:sp>
+      <p:pic>
+        <p:nvPicPr>
+          <p:cNvPr id="5" name="Picture 4" descr="A diagram of a cloud with icons&#10;&#10;AI-generated content may be incorrect.">
+            <a:extLst>
+              <a:ext uri="{FF2B5EF4-FFF2-40B4-BE49-F238E27FC236}">
+                <a16:creationId xmlns:a16="http://schemas.microsoft.com/office/drawing/2014/main" id="{41E1C4D7-4718-D0EF-75B5-801B6B7FEE26}"/>
+              </a:ext>
+            </a:extLst>
+          </p:cNvPr>
+          <p:cNvPicPr>
+            <a:picLocks noChangeAspect="1"/>
+          </p:cNvPicPr>
+          <p:nvPr/>
+        </p:nvPicPr>
+        <p:blipFill>
+          <a:blip r:embed="rId3">
+            <a:extLst>
+              <a:ext uri="{28A0092B-C50C-407E-A947-70E740481C1C}">
+                <a14:useLocalDpi xmlns:a14="http://schemas.microsoft.com/office/drawing/2010/main" val="0"/>
+              </a:ext>
+            </a:extLst>
+          </a:blip>
+          <a:stretch>
+            <a:fillRect/>
+          </a:stretch>
+        </p:blipFill>
+        <p:spPr>
+          <a:xfrm>
+            <a:off x="3433911" y="6428507"/>
+            <a:ext cx="2162175" cy="2170112"/>
+          </a:xfrm>
+          <a:prstGeom prst="rect">
+            <a:avLst/>
+          </a:prstGeom>
+        </p:spPr>
+      </p:pic>
+      <p:pic>
+        <p:nvPicPr>
+          <p:cNvPr id="7" name="Picture 6" descr="A close-up of a machine&#10;&#10;AI-generated content may be incorrect.">
+            <a:extLst>
+              <a:ext uri="{FF2B5EF4-FFF2-40B4-BE49-F238E27FC236}">
+                <a16:creationId xmlns:a16="http://schemas.microsoft.com/office/drawing/2014/main" id="{4AD74DF7-005D-0321-9090-F9C19EFD0383}"/>
+              </a:ext>
+            </a:extLst>
+          </p:cNvPr>
+          <p:cNvPicPr>
+            <a:picLocks noChangeAspect="1"/>
+          </p:cNvPicPr>
+          <p:nvPr/>
+        </p:nvPicPr>
+        <p:blipFill>
+          <a:blip r:embed="rId4">
+            <a:extLst>
+              <a:ext uri="{28A0092B-C50C-407E-A947-70E740481C1C}">
+                <a14:useLocalDpi xmlns:a14="http://schemas.microsoft.com/office/drawing/2010/main" val="0"/>
+              </a:ext>
+            </a:extLst>
+          </a:blip>
+          <a:stretch>
+            <a:fillRect/>
+          </a:stretch>
+        </p:blipFill>
+        <p:spPr>
+          <a:xfrm>
+            <a:off x="711188" y="6432085"/>
+            <a:ext cx="2170766" cy="2162956"/>
+          </a:xfrm>
+          <a:prstGeom prst="rect">
+            <a:avLst/>
+          </a:prstGeom>
+        </p:spPr>
+      </p:pic>
+      <p:pic>
+        <p:nvPicPr>
+          <p:cNvPr id="9" name="Picture 8" descr="A screenshot of a computer&#10;&#10;AI-generated content may be incorrect.">
+            <a:extLst>
+              <a:ext uri="{FF2B5EF4-FFF2-40B4-BE49-F238E27FC236}">
+                <a16:creationId xmlns:a16="http://schemas.microsoft.com/office/drawing/2014/main" id="{6348A488-BAFF-0C67-F2C6-590A004E225E}"/>
+              </a:ext>
+            </a:extLst>
+          </p:cNvPr>
+          <p:cNvPicPr>
+            <a:picLocks noChangeAspect="1"/>
+          </p:cNvPicPr>
+          <p:nvPr/>
+        </p:nvPicPr>
+        <p:blipFill>
+          <a:blip r:embed="rId5">
+            <a:extLst>
+              <a:ext uri="{28A0092B-C50C-407E-A947-70E740481C1C}">
+                <a14:useLocalDpi xmlns:a14="http://schemas.microsoft.com/office/drawing/2010/main" val="0"/>
+              </a:ext>
+            </a:extLst>
+          </a:blip>
+          <a:stretch>
+            <a:fillRect/>
+          </a:stretch>
+        </p:blipFill>
+        <p:spPr>
+          <a:xfrm>
+            <a:off x="6172200" y="6387537"/>
+            <a:ext cx="2234546" cy="2207116"/>
+          </a:xfrm>
+          <a:prstGeom prst="rect">
+            <a:avLst/>
+          </a:prstGeom>
+        </p:spPr>
+      </p:pic>
+      <p:pic>
+        <p:nvPicPr>
+          <p:cNvPr id="11" name="Picture 10" descr="A black background with a black square&#10;&#10;AI-generated content may be incorrect.">
+            <a:extLst>
+              <a:ext uri="{FF2B5EF4-FFF2-40B4-BE49-F238E27FC236}">
+                <a16:creationId xmlns:a16="http://schemas.microsoft.com/office/drawing/2014/main" id="{B5A0D468-60F8-BC4F-87AF-CB1E7E2A0A75}"/>
+              </a:ext>
+            </a:extLst>
+          </p:cNvPr>
+          <p:cNvPicPr>
+            <a:picLocks noChangeAspect="1"/>
+          </p:cNvPicPr>
+          <p:nvPr/>
+        </p:nvPicPr>
+        <p:blipFill>
+          <a:blip r:embed="rId6">
+            <a:extLst>
+              <a:ext uri="{28A0092B-C50C-407E-A947-70E740481C1C}">
+                <a14:useLocalDpi xmlns:a14="http://schemas.microsoft.com/office/drawing/2010/main" val="0"/>
+              </a:ext>
+            </a:extLst>
+          </a:blip>
+          <a:srcRect r="68502"/>
+          <a:stretch/>
+        </p:blipFill>
+        <p:spPr>
+          <a:xfrm>
+            <a:off x="7614971" y="533400"/>
+            <a:ext cx="1172093" cy="1154845"/>
+          </a:xfrm>
+          <a:prstGeom prst="rect">
+            <a:avLst/>
+          </a:prstGeom>
+        </p:spPr>
+      </p:pic>
     </p:spTree>
   </p:cSld>
   <p:clrMapOvr>

</xml_diff>